<commit_message>
Finish. Prospect Theory done.
</commit_message>
<xml_diff>
--- a/analysis/submitted_analyses/ReferenceDependentModels_Choice.pptx
+++ b/analysis/submitted_analyses/ReferenceDependentModels_Choice.pptx
@@ -243,7 +243,7 @@
           <a:p>
             <a:fld id="{CFC60B5F-2253-DF41-8690-61B53F1555CE}" type="datetimeFigureOut">
               <a:rPr lang="en-US" smtClean="0"/>
-              <a:t>5/16/24</a:t>
+              <a:t>5/20/24</a:t>
             </a:fld>
             <a:endParaRPr lang="en-US"/>
           </a:p>
@@ -413,7 +413,7 @@
           <a:p>
             <a:fld id="{CFC60B5F-2253-DF41-8690-61B53F1555CE}" type="datetimeFigureOut">
               <a:rPr lang="en-US" smtClean="0"/>
-              <a:t>5/16/24</a:t>
+              <a:t>5/20/24</a:t>
             </a:fld>
             <a:endParaRPr lang="en-US"/>
           </a:p>
@@ -593,7 +593,7 @@
           <a:p>
             <a:fld id="{CFC60B5F-2253-DF41-8690-61B53F1555CE}" type="datetimeFigureOut">
               <a:rPr lang="en-US" smtClean="0"/>
-              <a:t>5/16/24</a:t>
+              <a:t>5/20/24</a:t>
             </a:fld>
             <a:endParaRPr lang="en-US"/>
           </a:p>
@@ -763,7 +763,7 @@
           <a:p>
             <a:fld id="{CFC60B5F-2253-DF41-8690-61B53F1555CE}" type="datetimeFigureOut">
               <a:rPr lang="en-US" smtClean="0"/>
-              <a:t>5/16/24</a:t>
+              <a:t>5/20/24</a:t>
             </a:fld>
             <a:endParaRPr lang="en-US"/>
           </a:p>
@@ -1007,7 +1007,7 @@
           <a:p>
             <a:fld id="{CFC60B5F-2253-DF41-8690-61B53F1555CE}" type="datetimeFigureOut">
               <a:rPr lang="en-US" smtClean="0"/>
-              <a:t>5/16/24</a:t>
+              <a:t>5/20/24</a:t>
             </a:fld>
             <a:endParaRPr lang="en-US"/>
           </a:p>
@@ -1239,7 +1239,7 @@
           <a:p>
             <a:fld id="{CFC60B5F-2253-DF41-8690-61B53F1555CE}" type="datetimeFigureOut">
               <a:rPr lang="en-US" smtClean="0"/>
-              <a:t>5/16/24</a:t>
+              <a:t>5/20/24</a:t>
             </a:fld>
             <a:endParaRPr lang="en-US"/>
           </a:p>
@@ -1606,7 +1606,7 @@
           <a:p>
             <a:fld id="{CFC60B5F-2253-DF41-8690-61B53F1555CE}" type="datetimeFigureOut">
               <a:rPr lang="en-US" smtClean="0"/>
-              <a:t>5/16/24</a:t>
+              <a:t>5/20/24</a:t>
             </a:fld>
             <a:endParaRPr lang="en-US"/>
           </a:p>
@@ -1724,7 +1724,7 @@
           <a:p>
             <a:fld id="{CFC60B5F-2253-DF41-8690-61B53F1555CE}" type="datetimeFigureOut">
               <a:rPr lang="en-US" smtClean="0"/>
-              <a:t>5/16/24</a:t>
+              <a:t>5/20/24</a:t>
             </a:fld>
             <a:endParaRPr lang="en-US"/>
           </a:p>
@@ -1819,7 +1819,7 @@
           <a:p>
             <a:fld id="{CFC60B5F-2253-DF41-8690-61B53F1555CE}" type="datetimeFigureOut">
               <a:rPr lang="en-US" smtClean="0"/>
-              <a:t>5/16/24</a:t>
+              <a:t>5/20/24</a:t>
             </a:fld>
             <a:endParaRPr lang="en-US"/>
           </a:p>
@@ -2096,7 +2096,7 @@
           <a:p>
             <a:fld id="{CFC60B5F-2253-DF41-8690-61B53F1555CE}" type="datetimeFigureOut">
               <a:rPr lang="en-US" smtClean="0"/>
-              <a:t>5/16/24</a:t>
+              <a:t>5/20/24</a:t>
             </a:fld>
             <a:endParaRPr lang="en-US"/>
           </a:p>
@@ -2353,7 +2353,7 @@
           <a:p>
             <a:fld id="{CFC60B5F-2253-DF41-8690-61B53F1555CE}" type="datetimeFigureOut">
               <a:rPr lang="en-US" smtClean="0"/>
-              <a:t>5/16/24</a:t>
+              <a:t>5/20/24</a:t>
             </a:fld>
             <a:endParaRPr lang="en-US"/>
           </a:p>
@@ -2566,7 +2566,7 @@
           <a:p>
             <a:fld id="{CFC60B5F-2253-DF41-8690-61B53F1555CE}" type="datetimeFigureOut">
               <a:rPr lang="en-US" smtClean="0"/>
-              <a:t>5/16/24</a:t>
+              <a:t>5/20/24</a:t>
             </a:fld>
             <a:endParaRPr lang="en-US"/>
           </a:p>
@@ -2971,12 +2971,164 @@
           <a:chExt cx="0" cy="0"/>
         </a:xfrm>
       </p:grpSpPr>
+      <p:sp>
+        <p:nvSpPr>
+          <p:cNvPr id="8" name="TextBox 7">
+            <a:extLst>
+              <a:ext uri="{FF2B5EF4-FFF2-40B4-BE49-F238E27FC236}">
+                <a16:creationId xmlns:a16="http://schemas.microsoft.com/office/drawing/2014/main" id="{F29E1621-45F5-0E44-8AE7-A27A3F167BBB}"/>
+              </a:ext>
+            </a:extLst>
+          </p:cNvPr>
+          <p:cNvSpPr txBox="1"/>
+          <p:nvPr/>
+        </p:nvSpPr>
+        <p:spPr>
+          <a:xfrm rot="16200000">
+            <a:off x="-1972022" y="1959923"/>
+            <a:ext cx="4381500" cy="461665"/>
+          </a:xfrm>
+          <a:prstGeom prst="rect">
+            <a:avLst/>
+          </a:prstGeom>
+          <a:noFill/>
+        </p:spPr>
+        <p:txBody>
+          <a:bodyPr wrap="square" rtlCol="0">
+            <a:spAutoFit/>
+          </a:bodyPr>
+          <a:lstStyle/>
+          <a:p>
+            <a:pPr algn="ctr"/>
+            <a:r>
+              <a:rPr lang="en-US" sz="2400" b="1" u="sng" dirty="0"/>
+              <a:t>Status Quo (Participation Fee)</a:t>
+            </a:r>
+          </a:p>
+        </p:txBody>
+      </p:sp>
+      <p:sp>
+        <p:nvSpPr>
+          <p:cNvPr id="9" name="TextBox 8">
+            <a:extLst>
+              <a:ext uri="{FF2B5EF4-FFF2-40B4-BE49-F238E27FC236}">
+                <a16:creationId xmlns:a16="http://schemas.microsoft.com/office/drawing/2014/main" id="{AFFD002C-597E-27AE-5BF2-45F12AD9ABE3}"/>
+              </a:ext>
+            </a:extLst>
+          </p:cNvPr>
+          <p:cNvSpPr txBox="1"/>
+          <p:nvPr/>
+        </p:nvSpPr>
+        <p:spPr>
+          <a:xfrm rot="16200000">
+            <a:off x="-1965970" y="6341423"/>
+            <a:ext cx="4381500" cy="461665"/>
+          </a:xfrm>
+          <a:prstGeom prst="rect">
+            <a:avLst/>
+          </a:prstGeom>
+          <a:noFill/>
+        </p:spPr>
+        <p:txBody>
+          <a:bodyPr wrap="square" rtlCol="0">
+            <a:spAutoFit/>
+          </a:bodyPr>
+          <a:lstStyle/>
+          <a:p>
+            <a:pPr algn="ctr"/>
+            <a:r>
+              <a:rPr lang="en-US" sz="2400" b="1" u="sng" dirty="0" err="1"/>
+              <a:t>MaxMin</a:t>
+            </a:r>
+            <a:r>
+              <a:rPr lang="en-US" sz="2400" b="1" u="sng" dirty="0"/>
+              <a:t> (Saliency)</a:t>
+            </a:r>
+          </a:p>
+        </p:txBody>
+      </p:sp>
+      <p:sp>
+        <p:nvSpPr>
+          <p:cNvPr id="10" name="TextBox 9">
+            <a:extLst>
+              <a:ext uri="{FF2B5EF4-FFF2-40B4-BE49-F238E27FC236}">
+                <a16:creationId xmlns:a16="http://schemas.microsoft.com/office/drawing/2014/main" id="{2ABA556E-AFE0-CEA5-DFB2-E44B5456DAE4}"/>
+              </a:ext>
+            </a:extLst>
+          </p:cNvPr>
+          <p:cNvSpPr txBox="1"/>
+          <p:nvPr/>
+        </p:nvSpPr>
+        <p:spPr>
+          <a:xfrm rot="16200000">
+            <a:off x="-1959918" y="10722925"/>
+            <a:ext cx="4381500" cy="461665"/>
+          </a:xfrm>
+          <a:prstGeom prst="rect">
+            <a:avLst/>
+          </a:prstGeom>
+          <a:noFill/>
+        </p:spPr>
+        <p:txBody>
+          <a:bodyPr wrap="square" rtlCol="0">
+            <a:spAutoFit/>
+          </a:bodyPr>
+          <a:lstStyle/>
+          <a:p>
+            <a:pPr algn="ctr"/>
+            <a:r>
+              <a:rPr lang="en-US" sz="2400" b="1" u="sng" dirty="0" err="1"/>
+              <a:t>MinMax</a:t>
+            </a:r>
+            <a:r>
+              <a:rPr lang="en-US" sz="2400" b="1" u="sng" dirty="0"/>
+              <a:t> (Saliency)</a:t>
+            </a:r>
+          </a:p>
+        </p:txBody>
+      </p:sp>
+      <p:sp>
+        <p:nvSpPr>
+          <p:cNvPr id="12" name="TextBox 11">
+            <a:extLst>
+              <a:ext uri="{FF2B5EF4-FFF2-40B4-BE49-F238E27FC236}">
+                <a16:creationId xmlns:a16="http://schemas.microsoft.com/office/drawing/2014/main" id="{0444BC84-0EF8-94A5-777E-4C0B9A45018B}"/>
+              </a:ext>
+            </a:extLst>
+          </p:cNvPr>
+          <p:cNvSpPr txBox="1"/>
+          <p:nvPr/>
+        </p:nvSpPr>
+        <p:spPr>
+          <a:xfrm rot="16200000">
+            <a:off x="-1959918" y="15104425"/>
+            <a:ext cx="4381500" cy="461665"/>
+          </a:xfrm>
+          <a:prstGeom prst="rect">
+            <a:avLst/>
+          </a:prstGeom>
+          <a:noFill/>
+        </p:spPr>
+        <p:txBody>
+          <a:bodyPr wrap="square" rtlCol="0">
+            <a:spAutoFit/>
+          </a:bodyPr>
+          <a:lstStyle/>
+          <a:p>
+            <a:pPr algn="ctr"/>
+            <a:r>
+              <a:rPr lang="en-US" sz="2400" b="1" u="sng" dirty="0"/>
+              <a:t>X at Max P (Saliency)</a:t>
+            </a:r>
+          </a:p>
+        </p:txBody>
+      </p:sp>
       <p:pic>
         <p:nvPicPr>
-          <p:cNvPr id="5" name="Picture 4">
+          <p:cNvPr id="3" name="Picture 2">
             <a:extLst>
               <a:ext uri="{FF2B5EF4-FFF2-40B4-BE49-F238E27FC236}">
-                <a16:creationId xmlns:a16="http://schemas.microsoft.com/office/drawing/2014/main" id="{51B4B2FA-B468-A6CF-DD3F-12C1A59A4D94}"/>
+                <a16:creationId xmlns:a16="http://schemas.microsoft.com/office/drawing/2014/main" id="{E936D301-885A-2D9B-2C64-1E4A60C4D40E}"/>
               </a:ext>
             </a:extLst>
           </p:cNvPr>
@@ -2993,7 +3145,7 @@
         </p:blipFill>
         <p:spPr>
           <a:xfrm>
-            <a:off x="449561" y="0"/>
+            <a:off x="497977" y="-7888"/>
             <a:ext cx="6578600" cy="4381500"/>
           </a:xfrm>
           <a:prstGeom prst="rect">
@@ -3001,12 +3153,48 @@
           </a:prstGeom>
         </p:spPr>
       </p:pic>
+      <p:sp>
+        <p:nvSpPr>
+          <p:cNvPr id="13" name="TextBox 12">
+            <a:extLst>
+              <a:ext uri="{FF2B5EF4-FFF2-40B4-BE49-F238E27FC236}">
+                <a16:creationId xmlns:a16="http://schemas.microsoft.com/office/drawing/2014/main" id="{1CE7EBC8-ACA2-2D66-7C1D-BCD0369322C0}"/>
+              </a:ext>
+            </a:extLst>
+          </p:cNvPr>
+          <p:cNvSpPr txBox="1"/>
+          <p:nvPr/>
+        </p:nvSpPr>
+        <p:spPr>
+          <a:xfrm rot="16200000">
+            <a:off x="-1959918" y="19485926"/>
+            <a:ext cx="4381500" cy="461665"/>
+          </a:xfrm>
+          <a:prstGeom prst="rect">
+            <a:avLst/>
+          </a:prstGeom>
+          <a:noFill/>
+        </p:spPr>
+        <p:txBody>
+          <a:bodyPr wrap="square" rtlCol="0">
+            <a:spAutoFit/>
+          </a:bodyPr>
+          <a:lstStyle/>
+          <a:p>
+            <a:pPr algn="ctr"/>
+            <a:r>
+              <a:rPr lang="en-US" sz="2400" b="1" u="sng" dirty="0"/>
+              <a:t>Expected Value (Bell 1985)</a:t>
+            </a:r>
+          </a:p>
+        </p:txBody>
+      </p:sp>
       <p:pic>
         <p:nvPicPr>
-          <p:cNvPr id="7" name="Picture 6">
+          <p:cNvPr id="6" name="Picture 5">
             <a:extLst>
               <a:ext uri="{FF2B5EF4-FFF2-40B4-BE49-F238E27FC236}">
-                <a16:creationId xmlns:a16="http://schemas.microsoft.com/office/drawing/2014/main" id="{866128FC-2D38-FE28-8F43-BE45511CC2B9}"/>
+                <a16:creationId xmlns:a16="http://schemas.microsoft.com/office/drawing/2014/main" id="{106BA08D-1A22-CA71-4C98-02FFE1BE148D}"/>
               </a:ext>
             </a:extLst>
           </p:cNvPr>
@@ -3023,202 +3211,14 @@
         </p:blipFill>
         <p:spPr>
           <a:xfrm>
-            <a:off x="7028161" y="0"/>
-            <a:ext cx="6572250" cy="4381500"/>
+            <a:off x="7076577" y="0"/>
+            <a:ext cx="6548586" cy="4365724"/>
           </a:xfrm>
           <a:prstGeom prst="rect">
             <a:avLst/>
           </a:prstGeom>
         </p:spPr>
       </p:pic>
-      <p:sp>
-        <p:nvSpPr>
-          <p:cNvPr id="8" name="TextBox 7">
-            <a:extLst>
-              <a:ext uri="{FF2B5EF4-FFF2-40B4-BE49-F238E27FC236}">
-                <a16:creationId xmlns:a16="http://schemas.microsoft.com/office/drawing/2014/main" id="{F29E1621-45F5-0E44-8AE7-A27A3F167BBB}"/>
-              </a:ext>
-            </a:extLst>
-          </p:cNvPr>
-          <p:cNvSpPr txBox="1"/>
-          <p:nvPr/>
-        </p:nvSpPr>
-        <p:spPr>
-          <a:xfrm rot="16200000">
-            <a:off x="-1972022" y="1959923"/>
-            <a:ext cx="4381500" cy="461665"/>
-          </a:xfrm>
-          <a:prstGeom prst="rect">
-            <a:avLst/>
-          </a:prstGeom>
-          <a:noFill/>
-        </p:spPr>
-        <p:txBody>
-          <a:bodyPr wrap="square" rtlCol="0">
-            <a:spAutoFit/>
-          </a:bodyPr>
-          <a:lstStyle/>
-          <a:p>
-            <a:pPr algn="ctr"/>
-            <a:r>
-              <a:rPr lang="en-US" sz="2400" b="1" u="sng" dirty="0"/>
-              <a:t>Status Quo (Participation Fee)</a:t>
-            </a:r>
-          </a:p>
-        </p:txBody>
-      </p:sp>
-      <p:sp>
-        <p:nvSpPr>
-          <p:cNvPr id="9" name="TextBox 8">
-            <a:extLst>
-              <a:ext uri="{FF2B5EF4-FFF2-40B4-BE49-F238E27FC236}">
-                <a16:creationId xmlns:a16="http://schemas.microsoft.com/office/drawing/2014/main" id="{AFFD002C-597E-27AE-5BF2-45F12AD9ABE3}"/>
-              </a:ext>
-            </a:extLst>
-          </p:cNvPr>
-          <p:cNvSpPr txBox="1"/>
-          <p:nvPr/>
-        </p:nvSpPr>
-        <p:spPr>
-          <a:xfrm rot="16200000">
-            <a:off x="-1965970" y="6341423"/>
-            <a:ext cx="4381500" cy="461665"/>
-          </a:xfrm>
-          <a:prstGeom prst="rect">
-            <a:avLst/>
-          </a:prstGeom>
-          <a:noFill/>
-        </p:spPr>
-        <p:txBody>
-          <a:bodyPr wrap="square" rtlCol="0">
-            <a:spAutoFit/>
-          </a:bodyPr>
-          <a:lstStyle/>
-          <a:p>
-            <a:pPr algn="ctr"/>
-            <a:r>
-              <a:rPr lang="en-US" sz="2400" b="1" u="sng" dirty="0" err="1"/>
-              <a:t>MaxMin</a:t>
-            </a:r>
-            <a:r>
-              <a:rPr lang="en-US" sz="2400" b="1" u="sng" dirty="0"/>
-              <a:t> (Saliency)</a:t>
-            </a:r>
-          </a:p>
-        </p:txBody>
-      </p:sp>
-      <p:sp>
-        <p:nvSpPr>
-          <p:cNvPr id="10" name="TextBox 9">
-            <a:extLst>
-              <a:ext uri="{FF2B5EF4-FFF2-40B4-BE49-F238E27FC236}">
-                <a16:creationId xmlns:a16="http://schemas.microsoft.com/office/drawing/2014/main" id="{2ABA556E-AFE0-CEA5-DFB2-E44B5456DAE4}"/>
-              </a:ext>
-            </a:extLst>
-          </p:cNvPr>
-          <p:cNvSpPr txBox="1"/>
-          <p:nvPr/>
-        </p:nvSpPr>
-        <p:spPr>
-          <a:xfrm rot="16200000">
-            <a:off x="-1959918" y="10722925"/>
-            <a:ext cx="4381500" cy="461665"/>
-          </a:xfrm>
-          <a:prstGeom prst="rect">
-            <a:avLst/>
-          </a:prstGeom>
-          <a:noFill/>
-        </p:spPr>
-        <p:txBody>
-          <a:bodyPr wrap="square" rtlCol="0">
-            <a:spAutoFit/>
-          </a:bodyPr>
-          <a:lstStyle/>
-          <a:p>
-            <a:pPr algn="ctr"/>
-            <a:r>
-              <a:rPr lang="en-US" sz="2400" b="1" u="sng" dirty="0" err="1"/>
-              <a:t>MinMax</a:t>
-            </a:r>
-            <a:r>
-              <a:rPr lang="en-US" sz="2400" b="1" u="sng" dirty="0"/>
-              <a:t> (Saliency)</a:t>
-            </a:r>
-          </a:p>
-        </p:txBody>
-      </p:sp>
-      <p:sp>
-        <p:nvSpPr>
-          <p:cNvPr id="12" name="TextBox 11">
-            <a:extLst>
-              <a:ext uri="{FF2B5EF4-FFF2-40B4-BE49-F238E27FC236}">
-                <a16:creationId xmlns:a16="http://schemas.microsoft.com/office/drawing/2014/main" id="{0444BC84-0EF8-94A5-777E-4C0B9A45018B}"/>
-              </a:ext>
-            </a:extLst>
-          </p:cNvPr>
-          <p:cNvSpPr txBox="1"/>
-          <p:nvPr/>
-        </p:nvSpPr>
-        <p:spPr>
-          <a:xfrm rot="16200000">
-            <a:off x="-1959918" y="15104425"/>
-            <a:ext cx="4381500" cy="461665"/>
-          </a:xfrm>
-          <a:prstGeom prst="rect">
-            <a:avLst/>
-          </a:prstGeom>
-          <a:noFill/>
-        </p:spPr>
-        <p:txBody>
-          <a:bodyPr wrap="square" rtlCol="0">
-            <a:spAutoFit/>
-          </a:bodyPr>
-          <a:lstStyle/>
-          <a:p>
-            <a:pPr algn="ctr"/>
-            <a:r>
-              <a:rPr lang="en-US" sz="2400" b="1" u="sng" dirty="0"/>
-              <a:t>X at Max P (Saliency)</a:t>
-            </a:r>
-          </a:p>
-        </p:txBody>
-      </p:sp>
-      <p:sp>
-        <p:nvSpPr>
-          <p:cNvPr id="13" name="TextBox 12">
-            <a:extLst>
-              <a:ext uri="{FF2B5EF4-FFF2-40B4-BE49-F238E27FC236}">
-                <a16:creationId xmlns:a16="http://schemas.microsoft.com/office/drawing/2014/main" id="{1CE7EBC8-ACA2-2D66-7C1D-BCD0369322C0}"/>
-              </a:ext>
-            </a:extLst>
-          </p:cNvPr>
-          <p:cNvSpPr txBox="1"/>
-          <p:nvPr/>
-        </p:nvSpPr>
-        <p:spPr>
-          <a:xfrm rot="16200000">
-            <a:off x="-1959918" y="19485926"/>
-            <a:ext cx="4381500" cy="461665"/>
-          </a:xfrm>
-          <a:prstGeom prst="rect">
-            <a:avLst/>
-          </a:prstGeom>
-          <a:noFill/>
-        </p:spPr>
-        <p:txBody>
-          <a:bodyPr wrap="square" rtlCol="0">
-            <a:spAutoFit/>
-          </a:bodyPr>
-          <a:lstStyle/>
-          <a:p>
-            <a:pPr algn="ctr"/>
-            <a:r>
-              <a:rPr lang="en-US" sz="2400" b="1" u="sng" dirty="0"/>
-              <a:t>Expected Value (Bell 1985)</a:t>
-            </a:r>
-          </a:p>
-        </p:txBody>
-      </p:sp>
       <p:sp>
         <p:nvSpPr>
           <p:cNvPr id="14" name="TextBox 13">
@@ -3265,10 +3265,10 @@
       </p:sp>
       <p:pic>
         <p:nvPicPr>
-          <p:cNvPr id="16" name="Picture 15">
+          <p:cNvPr id="15" name="Picture 14">
             <a:extLst>
               <a:ext uri="{FF2B5EF4-FFF2-40B4-BE49-F238E27FC236}">
-                <a16:creationId xmlns:a16="http://schemas.microsoft.com/office/drawing/2014/main" id="{BA9A1FED-7BE8-EACC-04F3-6438F716A7E4}"/>
+                <a16:creationId xmlns:a16="http://schemas.microsoft.com/office/drawing/2014/main" id="{D98220D0-E453-1DE2-58F7-B27373B5DDA8}"/>
               </a:ext>
             </a:extLst>
           </p:cNvPr>
@@ -3285,7 +3285,7 @@
         </p:blipFill>
         <p:spPr>
           <a:xfrm>
-            <a:off x="443509" y="4381500"/>
+            <a:off x="497977" y="4368164"/>
             <a:ext cx="6578600" cy="4381500"/>
           </a:xfrm>
           <a:prstGeom prst="rect">
@@ -3295,10 +3295,10 @@
       </p:pic>
       <p:pic>
         <p:nvPicPr>
-          <p:cNvPr id="18" name="Picture 17">
+          <p:cNvPr id="19" name="Picture 18">
             <a:extLst>
               <a:ext uri="{FF2B5EF4-FFF2-40B4-BE49-F238E27FC236}">
-                <a16:creationId xmlns:a16="http://schemas.microsoft.com/office/drawing/2014/main" id="{2F29CAE8-E1FA-8958-A612-8B63DF438C56}"/>
+                <a16:creationId xmlns:a16="http://schemas.microsoft.com/office/drawing/2014/main" id="{E84E72D1-6AA8-EDEF-A815-BDB12613B414}"/>
               </a:ext>
             </a:extLst>
           </p:cNvPr>
@@ -3315,8 +3315,8 @@
         </p:blipFill>
         <p:spPr>
           <a:xfrm>
-            <a:off x="7034213" y="4381500"/>
-            <a:ext cx="6572250" cy="4381500"/>
+            <a:off x="7076577" y="4365724"/>
+            <a:ext cx="6496898" cy="4331265"/>
           </a:xfrm>
           <a:prstGeom prst="rect">
             <a:avLst/>
@@ -3325,10 +3325,10 @@
       </p:pic>
       <p:pic>
         <p:nvPicPr>
-          <p:cNvPr id="20" name="Picture 19">
+          <p:cNvPr id="23" name="Picture 22">
             <a:extLst>
               <a:ext uri="{FF2B5EF4-FFF2-40B4-BE49-F238E27FC236}">
-                <a16:creationId xmlns:a16="http://schemas.microsoft.com/office/drawing/2014/main" id="{7A99A35D-EA71-D5BD-4D19-E279323E6DA6}"/>
+                <a16:creationId xmlns:a16="http://schemas.microsoft.com/office/drawing/2014/main" id="{2B9E5F36-1EA2-4E7E-C79F-42B0F3840D79}"/>
               </a:ext>
             </a:extLst>
           </p:cNvPr>
@@ -3345,7 +3345,7 @@
         </p:blipFill>
         <p:spPr>
           <a:xfrm>
-            <a:off x="443509" y="8763001"/>
+            <a:off x="455613" y="8762978"/>
             <a:ext cx="6578600" cy="4381500"/>
           </a:xfrm>
           <a:prstGeom prst="rect">
@@ -3355,10 +3355,10 @@
       </p:pic>
       <p:pic>
         <p:nvPicPr>
-          <p:cNvPr id="22" name="Picture 21">
+          <p:cNvPr id="26" name="Picture 25">
             <a:extLst>
               <a:ext uri="{FF2B5EF4-FFF2-40B4-BE49-F238E27FC236}">
-                <a16:creationId xmlns:a16="http://schemas.microsoft.com/office/drawing/2014/main" id="{93D8C719-5E57-0EBA-BF04-7728DA1210E2}"/>
+                <a16:creationId xmlns:a16="http://schemas.microsoft.com/office/drawing/2014/main" id="{DBC9A40A-C634-764F-C3B1-71A23923D618}"/>
               </a:ext>
             </a:extLst>
           </p:cNvPr>
@@ -3375,8 +3375,8 @@
         </p:blipFill>
         <p:spPr>
           <a:xfrm>
-            <a:off x="7034213" y="8763000"/>
-            <a:ext cx="6572250" cy="4381500"/>
+            <a:off x="7088681" y="8747220"/>
+            <a:ext cx="6496898" cy="4331265"/>
           </a:xfrm>
           <a:prstGeom prst="rect">
             <a:avLst/>
@@ -3385,10 +3385,10 @@
       </p:pic>
       <p:pic>
         <p:nvPicPr>
-          <p:cNvPr id="25" name="Picture 24">
+          <p:cNvPr id="28" name="Picture 27">
             <a:extLst>
               <a:ext uri="{FF2B5EF4-FFF2-40B4-BE49-F238E27FC236}">
-                <a16:creationId xmlns:a16="http://schemas.microsoft.com/office/drawing/2014/main" id="{E1F3FE8C-5627-3D76-E9ED-1B8B7E034B31}"/>
+                <a16:creationId xmlns:a16="http://schemas.microsoft.com/office/drawing/2014/main" id="{40B49B7F-2D18-959B-2EEC-A8153142B6C9}"/>
               </a:ext>
             </a:extLst>
           </p:cNvPr>
@@ -3405,7 +3405,7 @@
         </p:blipFill>
         <p:spPr>
           <a:xfrm>
-            <a:off x="461665" y="13144506"/>
+            <a:off x="467717" y="13078485"/>
             <a:ext cx="6578600" cy="4381500"/>
           </a:xfrm>
           <a:prstGeom prst="rect">
@@ -3415,10 +3415,10 @@
       </p:pic>
       <p:pic>
         <p:nvPicPr>
-          <p:cNvPr id="29" name="Picture 28">
+          <p:cNvPr id="32" name="Picture 31">
             <a:extLst>
               <a:ext uri="{FF2B5EF4-FFF2-40B4-BE49-F238E27FC236}">
-                <a16:creationId xmlns:a16="http://schemas.microsoft.com/office/drawing/2014/main" id="{764958B2-810E-4400-550E-113226A4A41C}"/>
+                <a16:creationId xmlns:a16="http://schemas.microsoft.com/office/drawing/2014/main" id="{84FB0799-2BCC-1CAF-103D-FD699A417685}"/>
               </a:ext>
             </a:extLst>
           </p:cNvPr>
@@ -3435,8 +3435,8 @@
         </p:blipFill>
         <p:spPr>
           <a:xfrm>
-            <a:off x="7017570" y="13144496"/>
-            <a:ext cx="6572250" cy="4381500"/>
+            <a:off x="7087168" y="13078485"/>
+            <a:ext cx="6496898" cy="4331265"/>
           </a:xfrm>
           <a:prstGeom prst="rect">
             <a:avLst/>
@@ -3445,10 +3445,10 @@
       </p:pic>
       <p:pic>
         <p:nvPicPr>
-          <p:cNvPr id="31" name="Picture 30">
+          <p:cNvPr id="36" name="Picture 35">
             <a:extLst>
               <a:ext uri="{FF2B5EF4-FFF2-40B4-BE49-F238E27FC236}">
-                <a16:creationId xmlns:a16="http://schemas.microsoft.com/office/drawing/2014/main" id="{11A611F8-25A6-D8AB-19A9-711CC2BEF9F9}"/>
+                <a16:creationId xmlns:a16="http://schemas.microsoft.com/office/drawing/2014/main" id="{F3D4A290-CCF2-4544-B44C-1ADC22826B3C}"/>
               </a:ext>
             </a:extLst>
           </p:cNvPr>
@@ -3465,7 +3465,7 @@
         </p:blipFill>
         <p:spPr>
           <a:xfrm>
-            <a:off x="438970" y="17525991"/>
+            <a:off x="470873" y="17448806"/>
             <a:ext cx="6578600" cy="4381500"/>
           </a:xfrm>
           <a:prstGeom prst="rect">
@@ -3475,10 +3475,10 @@
       </p:pic>
       <p:pic>
         <p:nvPicPr>
-          <p:cNvPr id="33" name="Picture 32">
+          <p:cNvPr id="39" name="Picture 38">
             <a:extLst>
               <a:ext uri="{FF2B5EF4-FFF2-40B4-BE49-F238E27FC236}">
-                <a16:creationId xmlns:a16="http://schemas.microsoft.com/office/drawing/2014/main" id="{50A5FD2F-458E-CC84-2B4E-2206224F16B6}"/>
+                <a16:creationId xmlns:a16="http://schemas.microsoft.com/office/drawing/2014/main" id="{D84435EC-D4AF-FFF8-49A7-2B28E77AE9F2}"/>
               </a:ext>
             </a:extLst>
           </p:cNvPr>
@@ -3495,8 +3495,8 @@
         </p:blipFill>
         <p:spPr>
           <a:xfrm>
-            <a:off x="7058421" y="17525992"/>
-            <a:ext cx="6515054" cy="4343369"/>
+            <a:off x="7076577" y="17526008"/>
+            <a:ext cx="6496898" cy="4331265"/>
           </a:xfrm>
           <a:prstGeom prst="rect">
             <a:avLst/>
@@ -3505,10 +3505,10 @@
       </p:pic>
       <p:pic>
         <p:nvPicPr>
-          <p:cNvPr id="35" name="Picture 34">
+          <p:cNvPr id="41" name="Picture 40">
             <a:extLst>
               <a:ext uri="{FF2B5EF4-FFF2-40B4-BE49-F238E27FC236}">
-                <a16:creationId xmlns:a16="http://schemas.microsoft.com/office/drawing/2014/main" id="{44AC04D5-3A25-104B-0A44-8E77FC6FF5B5}"/>
+                <a16:creationId xmlns:a16="http://schemas.microsoft.com/office/drawing/2014/main" id="{E20042E6-D90F-2B8C-35B9-E3ECF5519797}"/>
               </a:ext>
             </a:extLst>
           </p:cNvPr>
@@ -3525,7 +3525,7 @@
         </p:blipFill>
         <p:spPr>
           <a:xfrm>
-            <a:off x="479821" y="21907474"/>
+            <a:off x="508568" y="21857273"/>
             <a:ext cx="6578600" cy="4381500"/>
           </a:xfrm>
           <a:prstGeom prst="rect">
@@ -3535,10 +3535,10 @@
       </p:pic>
       <p:pic>
         <p:nvPicPr>
-          <p:cNvPr id="37" name="Picture 36">
+          <p:cNvPr id="43" name="Picture 42">
             <a:extLst>
               <a:ext uri="{FF2B5EF4-FFF2-40B4-BE49-F238E27FC236}">
-                <a16:creationId xmlns:a16="http://schemas.microsoft.com/office/drawing/2014/main" id="{604E9B16-71AB-B521-5A8B-E689788A9D63}"/>
+                <a16:creationId xmlns:a16="http://schemas.microsoft.com/office/drawing/2014/main" id="{1316A2E1-557F-8E74-08E8-D0E11A735C8F}"/>
               </a:ext>
             </a:extLst>
           </p:cNvPr>
@@ -3555,8 +3555,8 @@
         </p:blipFill>
         <p:spPr>
           <a:xfrm>
-            <a:off x="7017570" y="21869361"/>
-            <a:ext cx="6555905" cy="4370603"/>
+            <a:off x="7087168" y="21907504"/>
+            <a:ext cx="6496898" cy="4331265"/>
           </a:xfrm>
           <a:prstGeom prst="rect">
             <a:avLst/>

</xml_diff>

<commit_message>
Possibly final code toolbox.
</commit_message>
<xml_diff>
--- a/analysis/submitted_analyses/ReferenceDependentModels_Choice.pptx
+++ b/analysis/submitted_analyses/ReferenceDependentModels_Choice.pptx
@@ -2,12 +2,12 @@
 <file path=ppt/presentation.xml><?xml version="1.0" encoding="utf-8"?>
 <p:presentation xmlns:a="http://schemas.openxmlformats.org/drawingml/2006/main" xmlns:r="http://schemas.openxmlformats.org/officeDocument/2006/relationships" xmlns:p="http://schemas.openxmlformats.org/presentationml/2006/main" saveSubsetFonts="1" autoCompressPictures="0">
   <p:sldMasterIdLst>
-    <p:sldMasterId id="2147483840" r:id="rId1"/>
+    <p:sldMasterId id="2147483852" r:id="rId1"/>
   </p:sldMasterIdLst>
   <p:sldIdLst>
     <p:sldId id="257" r:id="rId2"/>
   </p:sldIdLst>
-  <p:sldSz cx="13606463" cy="26517600"/>
+  <p:sldSz cx="13606463" cy="8778875"/>
   <p:notesSz cx="6858000" cy="9144000"/>
   <p:defaultTextStyle>
     <a:defPPr>
@@ -141,15 +141,15 @@
         </p:nvSpPr>
         <p:spPr>
           <a:xfrm>
-            <a:off x="1020485" y="4339804"/>
-            <a:ext cx="11565494" cy="9232053"/>
+            <a:off x="1020485" y="1436729"/>
+            <a:ext cx="11565494" cy="3056349"/>
           </a:xfrm>
         </p:spPr>
         <p:txBody>
           <a:bodyPr anchor="b"/>
           <a:lstStyle>
             <a:lvl1pPr algn="ctr">
-              <a:defRPr sz="8928"/>
+              <a:defRPr sz="7681"/>
             </a:lvl1pPr>
           </a:lstStyle>
           <a:p>
@@ -173,8 +173,8 @@
         </p:nvSpPr>
         <p:spPr>
           <a:xfrm>
-            <a:off x="1700808" y="13927880"/>
-            <a:ext cx="10204847" cy="6402280"/>
+            <a:off x="1700808" y="4610942"/>
+            <a:ext cx="10204847" cy="2119529"/>
           </a:xfrm>
         </p:spPr>
         <p:txBody>
@@ -182,39 +182,39 @@
           <a:lstStyle>
             <a:lvl1pPr marL="0" indent="0" algn="ctr">
               <a:buNone/>
-              <a:defRPr sz="3571"/>
+              <a:defRPr sz="3072"/>
             </a:lvl1pPr>
-            <a:lvl2pPr marL="680314" indent="0" algn="ctr">
-              <a:buNone/>
-              <a:defRPr sz="2976"/>
+            <a:lvl2pPr marL="585262" indent="0" algn="ctr">
+              <a:buNone/>
+              <a:defRPr sz="2560"/>
             </a:lvl2pPr>
-            <a:lvl3pPr marL="1360627" indent="0" algn="ctr">
-              <a:buNone/>
-              <a:defRPr sz="2678"/>
+            <a:lvl3pPr marL="1170523" indent="0" algn="ctr">
+              <a:buNone/>
+              <a:defRPr sz="2304"/>
             </a:lvl3pPr>
-            <a:lvl4pPr marL="2040941" indent="0" algn="ctr">
-              <a:buNone/>
-              <a:defRPr sz="2381"/>
+            <a:lvl4pPr marL="1755785" indent="0" algn="ctr">
+              <a:buNone/>
+              <a:defRPr sz="2048"/>
             </a:lvl4pPr>
-            <a:lvl5pPr marL="2721254" indent="0" algn="ctr">
-              <a:buNone/>
-              <a:defRPr sz="2381"/>
+            <a:lvl5pPr marL="2341047" indent="0" algn="ctr">
+              <a:buNone/>
+              <a:defRPr sz="2048"/>
             </a:lvl5pPr>
-            <a:lvl6pPr marL="3401568" indent="0" algn="ctr">
-              <a:buNone/>
-              <a:defRPr sz="2381"/>
+            <a:lvl6pPr marL="2926309" indent="0" algn="ctr">
+              <a:buNone/>
+              <a:defRPr sz="2048"/>
             </a:lvl6pPr>
-            <a:lvl7pPr marL="4081882" indent="0" algn="ctr">
-              <a:buNone/>
-              <a:defRPr sz="2381"/>
+            <a:lvl7pPr marL="3511570" indent="0" algn="ctr">
+              <a:buNone/>
+              <a:defRPr sz="2048"/>
             </a:lvl7pPr>
-            <a:lvl8pPr marL="4762195" indent="0" algn="ctr">
-              <a:buNone/>
-              <a:defRPr sz="2381"/>
+            <a:lvl8pPr marL="4096832" indent="0" algn="ctr">
+              <a:buNone/>
+              <a:defRPr sz="2048"/>
             </a:lvl8pPr>
-            <a:lvl9pPr marL="5442509" indent="0" algn="ctr">
-              <a:buNone/>
-              <a:defRPr sz="2381"/>
+            <a:lvl9pPr marL="4682094" indent="0" algn="ctr">
+              <a:buNone/>
+              <a:defRPr sz="2048"/>
             </a:lvl9pPr>
           </a:lstStyle>
           <a:p>
@@ -243,7 +243,7 @@
           <a:p>
             <a:fld id="{CFC60B5F-2253-DF41-8690-61B53F1555CE}" type="datetimeFigureOut">
               <a:rPr lang="en-US" smtClean="0"/>
-              <a:t>5/20/24</a:t>
+              <a:t>6/6/24</a:t>
             </a:fld>
             <a:endParaRPr lang="en-US"/>
           </a:p>
@@ -294,7 +294,7 @@
     </p:spTree>
     <p:extLst>
       <p:ext uri="{BB962C8B-B14F-4D97-AF65-F5344CB8AC3E}">
-        <p14:creationId xmlns:p14="http://schemas.microsoft.com/office/powerpoint/2010/main" val="675643684"/>
+        <p14:creationId xmlns:p14="http://schemas.microsoft.com/office/powerpoint/2010/main" val="2908862298"/>
       </p:ext>
     </p:extLst>
   </p:cSld>
@@ -413,7 +413,7 @@
           <a:p>
             <a:fld id="{CFC60B5F-2253-DF41-8690-61B53F1555CE}" type="datetimeFigureOut">
               <a:rPr lang="en-US" smtClean="0"/>
-              <a:t>5/20/24</a:t>
+              <a:t>6/6/24</a:t>
             </a:fld>
             <a:endParaRPr lang="en-US"/>
           </a:p>
@@ -464,7 +464,7 @@
     </p:spTree>
     <p:extLst>
       <p:ext uri="{BB962C8B-B14F-4D97-AF65-F5344CB8AC3E}">
-        <p14:creationId xmlns:p14="http://schemas.microsoft.com/office/powerpoint/2010/main" val="2038039434"/>
+        <p14:creationId xmlns:p14="http://schemas.microsoft.com/office/powerpoint/2010/main" val="1949343666"/>
       </p:ext>
     </p:extLst>
   </p:cSld>
@@ -503,8 +503,8 @@
         </p:nvSpPr>
         <p:spPr>
           <a:xfrm>
-            <a:off x="9737126" y="1411817"/>
-            <a:ext cx="2933894" cy="22472440"/>
+            <a:off x="9737126" y="467394"/>
+            <a:ext cx="2933894" cy="7439691"/>
           </a:xfrm>
         </p:spPr>
         <p:txBody>
@@ -531,8 +531,8 @@
         </p:nvSpPr>
         <p:spPr>
           <a:xfrm>
-            <a:off x="935445" y="1411817"/>
-            <a:ext cx="8631600" cy="22472440"/>
+            <a:off x="935445" y="467394"/>
+            <a:ext cx="8631600" cy="7439691"/>
           </a:xfrm>
         </p:spPr>
         <p:txBody>
@@ -593,7 +593,7 @@
           <a:p>
             <a:fld id="{CFC60B5F-2253-DF41-8690-61B53F1555CE}" type="datetimeFigureOut">
               <a:rPr lang="en-US" smtClean="0"/>
-              <a:t>5/20/24</a:t>
+              <a:t>6/6/24</a:t>
             </a:fld>
             <a:endParaRPr lang="en-US"/>
           </a:p>
@@ -644,7 +644,7 @@
     </p:spTree>
     <p:extLst>
       <p:ext uri="{BB962C8B-B14F-4D97-AF65-F5344CB8AC3E}">
-        <p14:creationId xmlns:p14="http://schemas.microsoft.com/office/powerpoint/2010/main" val="819624338"/>
+        <p14:creationId xmlns:p14="http://schemas.microsoft.com/office/powerpoint/2010/main" val="3448674074"/>
       </p:ext>
     </p:extLst>
   </p:cSld>
@@ -763,7 +763,7 @@
           <a:p>
             <a:fld id="{CFC60B5F-2253-DF41-8690-61B53F1555CE}" type="datetimeFigureOut">
               <a:rPr lang="en-US" smtClean="0"/>
-              <a:t>5/20/24</a:t>
+              <a:t>6/6/24</a:t>
             </a:fld>
             <a:endParaRPr lang="en-US"/>
           </a:p>
@@ -814,7 +814,7 @@
     </p:spTree>
     <p:extLst>
       <p:ext uri="{BB962C8B-B14F-4D97-AF65-F5344CB8AC3E}">
-        <p14:creationId xmlns:p14="http://schemas.microsoft.com/office/powerpoint/2010/main" val="3127028291"/>
+        <p14:creationId xmlns:p14="http://schemas.microsoft.com/office/powerpoint/2010/main" val="574858619"/>
       </p:ext>
     </p:extLst>
   </p:cSld>
@@ -853,15 +853,15 @@
         </p:nvSpPr>
         <p:spPr>
           <a:xfrm>
-            <a:off x="928359" y="6610993"/>
-            <a:ext cx="11735574" cy="11030583"/>
+            <a:off x="928359" y="2188625"/>
+            <a:ext cx="11735574" cy="3651768"/>
           </a:xfrm>
         </p:spPr>
         <p:txBody>
           <a:bodyPr anchor="b"/>
           <a:lstStyle>
             <a:lvl1pPr>
-              <a:defRPr sz="8928"/>
+              <a:defRPr sz="7681"/>
             </a:lvl1pPr>
           </a:lstStyle>
           <a:p>
@@ -885,8 +885,8 @@
         </p:nvSpPr>
         <p:spPr>
           <a:xfrm>
-            <a:off x="928359" y="17745929"/>
-            <a:ext cx="11735574" cy="5800723"/>
+            <a:off x="928359" y="5874940"/>
+            <a:ext cx="11735574" cy="1920378"/>
           </a:xfrm>
         </p:spPr>
         <p:txBody>
@@ -894,15 +894,15 @@
           <a:lstStyle>
             <a:lvl1pPr marL="0" indent="0">
               <a:buNone/>
-              <a:defRPr sz="3571">
+              <a:defRPr sz="3072">
                 <a:solidFill>
                   <a:schemeClr val="tx1"/>
                 </a:solidFill>
               </a:defRPr>
             </a:lvl1pPr>
-            <a:lvl2pPr marL="680314" indent="0">
-              <a:buNone/>
-              <a:defRPr sz="2976">
+            <a:lvl2pPr marL="585262" indent="0">
+              <a:buNone/>
+              <a:defRPr sz="2560">
                 <a:solidFill>
                   <a:schemeClr val="tx1">
                     <a:tint val="75000"/>
@@ -910,9 +910,9 @@
                 </a:solidFill>
               </a:defRPr>
             </a:lvl2pPr>
-            <a:lvl3pPr marL="1360627" indent="0">
-              <a:buNone/>
-              <a:defRPr sz="2678">
+            <a:lvl3pPr marL="1170523" indent="0">
+              <a:buNone/>
+              <a:defRPr sz="2304">
                 <a:solidFill>
                   <a:schemeClr val="tx1">
                     <a:tint val="75000"/>
@@ -920,9 +920,9 @@
                 </a:solidFill>
               </a:defRPr>
             </a:lvl3pPr>
-            <a:lvl4pPr marL="2040941" indent="0">
-              <a:buNone/>
-              <a:defRPr sz="2381">
+            <a:lvl4pPr marL="1755785" indent="0">
+              <a:buNone/>
+              <a:defRPr sz="2048">
                 <a:solidFill>
                   <a:schemeClr val="tx1">
                     <a:tint val="75000"/>
@@ -930,9 +930,9 @@
                 </a:solidFill>
               </a:defRPr>
             </a:lvl4pPr>
-            <a:lvl5pPr marL="2721254" indent="0">
-              <a:buNone/>
-              <a:defRPr sz="2381">
+            <a:lvl5pPr marL="2341047" indent="0">
+              <a:buNone/>
+              <a:defRPr sz="2048">
                 <a:solidFill>
                   <a:schemeClr val="tx1">
                     <a:tint val="75000"/>
@@ -940,9 +940,9 @@
                 </a:solidFill>
               </a:defRPr>
             </a:lvl5pPr>
-            <a:lvl6pPr marL="3401568" indent="0">
-              <a:buNone/>
-              <a:defRPr sz="2381">
+            <a:lvl6pPr marL="2926309" indent="0">
+              <a:buNone/>
+              <a:defRPr sz="2048">
                 <a:solidFill>
                   <a:schemeClr val="tx1">
                     <a:tint val="75000"/>
@@ -950,9 +950,9 @@
                 </a:solidFill>
               </a:defRPr>
             </a:lvl6pPr>
-            <a:lvl7pPr marL="4081882" indent="0">
-              <a:buNone/>
-              <a:defRPr sz="2381">
+            <a:lvl7pPr marL="3511570" indent="0">
+              <a:buNone/>
+              <a:defRPr sz="2048">
                 <a:solidFill>
                   <a:schemeClr val="tx1">
                     <a:tint val="75000"/>
@@ -960,9 +960,9 @@
                 </a:solidFill>
               </a:defRPr>
             </a:lvl7pPr>
-            <a:lvl8pPr marL="4762195" indent="0">
-              <a:buNone/>
-              <a:defRPr sz="2381">
+            <a:lvl8pPr marL="4096832" indent="0">
+              <a:buNone/>
+              <a:defRPr sz="2048">
                 <a:solidFill>
                   <a:schemeClr val="tx1">
                     <a:tint val="75000"/>
@@ -970,9 +970,9 @@
                 </a:solidFill>
               </a:defRPr>
             </a:lvl8pPr>
-            <a:lvl9pPr marL="5442509" indent="0">
-              <a:buNone/>
-              <a:defRPr sz="2381">
+            <a:lvl9pPr marL="4682094" indent="0">
+              <a:buNone/>
+              <a:defRPr sz="2048">
                 <a:solidFill>
                   <a:schemeClr val="tx1">
                     <a:tint val="75000"/>
@@ -1007,7 +1007,7 @@
           <a:p>
             <a:fld id="{CFC60B5F-2253-DF41-8690-61B53F1555CE}" type="datetimeFigureOut">
               <a:rPr lang="en-US" smtClean="0"/>
-              <a:t>5/20/24</a:t>
+              <a:t>6/6/24</a:t>
             </a:fld>
             <a:endParaRPr lang="en-US"/>
           </a:p>
@@ -1058,7 +1058,7 @@
     </p:spTree>
     <p:extLst>
       <p:ext uri="{BB962C8B-B14F-4D97-AF65-F5344CB8AC3E}">
-        <p14:creationId xmlns:p14="http://schemas.microsoft.com/office/powerpoint/2010/main" val="2656752829"/>
+        <p14:creationId xmlns:p14="http://schemas.microsoft.com/office/powerpoint/2010/main" val="1736515187"/>
       </p:ext>
     </p:extLst>
   </p:cSld>
@@ -1120,8 +1120,8 @@
         </p:nvSpPr>
         <p:spPr>
           <a:xfrm>
-            <a:off x="935444" y="7059083"/>
-            <a:ext cx="5782747" cy="16825174"/>
+            <a:off x="935444" y="2336969"/>
+            <a:ext cx="5782747" cy="5570116"/>
           </a:xfrm>
         </p:spPr>
         <p:txBody>
@@ -1177,8 +1177,8 @@
         </p:nvSpPr>
         <p:spPr>
           <a:xfrm>
-            <a:off x="6888272" y="7059083"/>
-            <a:ext cx="5782747" cy="16825174"/>
+            <a:off x="6888272" y="2336969"/>
+            <a:ext cx="5782747" cy="5570116"/>
           </a:xfrm>
         </p:spPr>
         <p:txBody>
@@ -1239,7 +1239,7 @@
           <a:p>
             <a:fld id="{CFC60B5F-2253-DF41-8690-61B53F1555CE}" type="datetimeFigureOut">
               <a:rPr lang="en-US" smtClean="0"/>
-              <a:t>5/20/24</a:t>
+              <a:t>6/6/24</a:t>
             </a:fld>
             <a:endParaRPr lang="en-US"/>
           </a:p>
@@ -1290,7 +1290,7 @@
     </p:spTree>
     <p:extLst>
       <p:ext uri="{BB962C8B-B14F-4D97-AF65-F5344CB8AC3E}">
-        <p14:creationId xmlns:p14="http://schemas.microsoft.com/office/powerpoint/2010/main" val="2059906326"/>
+        <p14:creationId xmlns:p14="http://schemas.microsoft.com/office/powerpoint/2010/main" val="1536308903"/>
       </p:ext>
     </p:extLst>
   </p:cSld>
@@ -1329,8 +1329,8 @@
         </p:nvSpPr>
         <p:spPr>
           <a:xfrm>
-            <a:off x="937217" y="1411823"/>
-            <a:ext cx="11735574" cy="5125510"/>
+            <a:off x="937217" y="467396"/>
+            <a:ext cx="11735574" cy="1696843"/>
           </a:xfrm>
         </p:spPr>
         <p:txBody>
@@ -1357,8 +1357,8 @@
         </p:nvSpPr>
         <p:spPr>
           <a:xfrm>
-            <a:off x="937218" y="6500497"/>
-            <a:ext cx="5756171" cy="3185793"/>
+            <a:off x="937218" y="2152044"/>
+            <a:ext cx="5756171" cy="1054684"/>
           </a:xfrm>
         </p:spPr>
         <p:txBody>
@@ -1366,39 +1366,39 @@
           <a:lstStyle>
             <a:lvl1pPr marL="0" indent="0">
               <a:buNone/>
-              <a:defRPr sz="3571" b="1"/>
+              <a:defRPr sz="3072" b="1"/>
             </a:lvl1pPr>
-            <a:lvl2pPr marL="680314" indent="0">
-              <a:buNone/>
-              <a:defRPr sz="2976" b="1"/>
+            <a:lvl2pPr marL="585262" indent="0">
+              <a:buNone/>
+              <a:defRPr sz="2560" b="1"/>
             </a:lvl2pPr>
-            <a:lvl3pPr marL="1360627" indent="0">
-              <a:buNone/>
-              <a:defRPr sz="2678" b="1"/>
+            <a:lvl3pPr marL="1170523" indent="0">
+              <a:buNone/>
+              <a:defRPr sz="2304" b="1"/>
             </a:lvl3pPr>
-            <a:lvl4pPr marL="2040941" indent="0">
-              <a:buNone/>
-              <a:defRPr sz="2381" b="1"/>
+            <a:lvl4pPr marL="1755785" indent="0">
+              <a:buNone/>
+              <a:defRPr sz="2048" b="1"/>
             </a:lvl4pPr>
-            <a:lvl5pPr marL="2721254" indent="0">
-              <a:buNone/>
-              <a:defRPr sz="2381" b="1"/>
+            <a:lvl5pPr marL="2341047" indent="0">
+              <a:buNone/>
+              <a:defRPr sz="2048" b="1"/>
             </a:lvl5pPr>
-            <a:lvl6pPr marL="3401568" indent="0">
-              <a:buNone/>
-              <a:defRPr sz="2381" b="1"/>
+            <a:lvl6pPr marL="2926309" indent="0">
+              <a:buNone/>
+              <a:defRPr sz="2048" b="1"/>
             </a:lvl6pPr>
-            <a:lvl7pPr marL="4081882" indent="0">
-              <a:buNone/>
-              <a:defRPr sz="2381" b="1"/>
+            <a:lvl7pPr marL="3511570" indent="0">
+              <a:buNone/>
+              <a:defRPr sz="2048" b="1"/>
             </a:lvl7pPr>
-            <a:lvl8pPr marL="4762195" indent="0">
-              <a:buNone/>
-              <a:defRPr sz="2381" b="1"/>
+            <a:lvl8pPr marL="4096832" indent="0">
+              <a:buNone/>
+              <a:defRPr sz="2048" b="1"/>
             </a:lvl8pPr>
-            <a:lvl9pPr marL="5442509" indent="0">
-              <a:buNone/>
-              <a:defRPr sz="2381" b="1"/>
+            <a:lvl9pPr marL="4682094" indent="0">
+              <a:buNone/>
+              <a:defRPr sz="2048" b="1"/>
             </a:lvl9pPr>
           </a:lstStyle>
           <a:p>
@@ -1422,8 +1422,8 @@
         </p:nvSpPr>
         <p:spPr>
           <a:xfrm>
-            <a:off x="937218" y="9686290"/>
-            <a:ext cx="5756171" cy="14247074"/>
+            <a:off x="937218" y="3206728"/>
+            <a:ext cx="5756171" cy="4716614"/>
           </a:xfrm>
         </p:spPr>
         <p:txBody>
@@ -1479,8 +1479,8 @@
         </p:nvSpPr>
         <p:spPr>
           <a:xfrm>
-            <a:off x="6888273" y="6500497"/>
-            <a:ext cx="5784519" cy="3185793"/>
+            <a:off x="6888273" y="2152044"/>
+            <a:ext cx="5784519" cy="1054684"/>
           </a:xfrm>
         </p:spPr>
         <p:txBody>
@@ -1488,39 +1488,39 @@
           <a:lstStyle>
             <a:lvl1pPr marL="0" indent="0">
               <a:buNone/>
-              <a:defRPr sz="3571" b="1"/>
+              <a:defRPr sz="3072" b="1"/>
             </a:lvl1pPr>
-            <a:lvl2pPr marL="680314" indent="0">
-              <a:buNone/>
-              <a:defRPr sz="2976" b="1"/>
+            <a:lvl2pPr marL="585262" indent="0">
+              <a:buNone/>
+              <a:defRPr sz="2560" b="1"/>
             </a:lvl2pPr>
-            <a:lvl3pPr marL="1360627" indent="0">
-              <a:buNone/>
-              <a:defRPr sz="2678" b="1"/>
+            <a:lvl3pPr marL="1170523" indent="0">
+              <a:buNone/>
+              <a:defRPr sz="2304" b="1"/>
             </a:lvl3pPr>
-            <a:lvl4pPr marL="2040941" indent="0">
-              <a:buNone/>
-              <a:defRPr sz="2381" b="1"/>
+            <a:lvl4pPr marL="1755785" indent="0">
+              <a:buNone/>
+              <a:defRPr sz="2048" b="1"/>
             </a:lvl4pPr>
-            <a:lvl5pPr marL="2721254" indent="0">
-              <a:buNone/>
-              <a:defRPr sz="2381" b="1"/>
+            <a:lvl5pPr marL="2341047" indent="0">
+              <a:buNone/>
+              <a:defRPr sz="2048" b="1"/>
             </a:lvl5pPr>
-            <a:lvl6pPr marL="3401568" indent="0">
-              <a:buNone/>
-              <a:defRPr sz="2381" b="1"/>
+            <a:lvl6pPr marL="2926309" indent="0">
+              <a:buNone/>
+              <a:defRPr sz="2048" b="1"/>
             </a:lvl6pPr>
-            <a:lvl7pPr marL="4081882" indent="0">
-              <a:buNone/>
-              <a:defRPr sz="2381" b="1"/>
+            <a:lvl7pPr marL="3511570" indent="0">
+              <a:buNone/>
+              <a:defRPr sz="2048" b="1"/>
             </a:lvl7pPr>
-            <a:lvl8pPr marL="4762195" indent="0">
-              <a:buNone/>
-              <a:defRPr sz="2381" b="1"/>
+            <a:lvl8pPr marL="4096832" indent="0">
+              <a:buNone/>
+              <a:defRPr sz="2048" b="1"/>
             </a:lvl8pPr>
-            <a:lvl9pPr marL="5442509" indent="0">
-              <a:buNone/>
-              <a:defRPr sz="2381" b="1"/>
+            <a:lvl9pPr marL="4682094" indent="0">
+              <a:buNone/>
+              <a:defRPr sz="2048" b="1"/>
             </a:lvl9pPr>
           </a:lstStyle>
           <a:p>
@@ -1544,8 +1544,8 @@
         </p:nvSpPr>
         <p:spPr>
           <a:xfrm>
-            <a:off x="6888273" y="9686290"/>
-            <a:ext cx="5784519" cy="14247074"/>
+            <a:off x="6888273" y="3206728"/>
+            <a:ext cx="5784519" cy="4716614"/>
           </a:xfrm>
         </p:spPr>
         <p:txBody>
@@ -1606,7 +1606,7 @@
           <a:p>
             <a:fld id="{CFC60B5F-2253-DF41-8690-61B53F1555CE}" type="datetimeFigureOut">
               <a:rPr lang="en-US" smtClean="0"/>
-              <a:t>5/20/24</a:t>
+              <a:t>6/6/24</a:t>
             </a:fld>
             <a:endParaRPr lang="en-US"/>
           </a:p>
@@ -1657,7 +1657,7 @@
     </p:spTree>
     <p:extLst>
       <p:ext uri="{BB962C8B-B14F-4D97-AF65-F5344CB8AC3E}">
-        <p14:creationId xmlns:p14="http://schemas.microsoft.com/office/powerpoint/2010/main" val="250104530"/>
+        <p14:creationId xmlns:p14="http://schemas.microsoft.com/office/powerpoint/2010/main" val="2365309462"/>
       </p:ext>
     </p:extLst>
   </p:cSld>
@@ -1724,7 +1724,7 @@
           <a:p>
             <a:fld id="{CFC60B5F-2253-DF41-8690-61B53F1555CE}" type="datetimeFigureOut">
               <a:rPr lang="en-US" smtClean="0"/>
-              <a:t>5/20/24</a:t>
+              <a:t>6/6/24</a:t>
             </a:fld>
             <a:endParaRPr lang="en-US"/>
           </a:p>
@@ -1775,7 +1775,7 @@
     </p:spTree>
     <p:extLst>
       <p:ext uri="{BB962C8B-B14F-4D97-AF65-F5344CB8AC3E}">
-        <p14:creationId xmlns:p14="http://schemas.microsoft.com/office/powerpoint/2010/main" val="3555140265"/>
+        <p14:creationId xmlns:p14="http://schemas.microsoft.com/office/powerpoint/2010/main" val="3785557098"/>
       </p:ext>
     </p:extLst>
   </p:cSld>
@@ -1819,7 +1819,7 @@
           <a:p>
             <a:fld id="{CFC60B5F-2253-DF41-8690-61B53F1555CE}" type="datetimeFigureOut">
               <a:rPr lang="en-US" smtClean="0"/>
-              <a:t>5/20/24</a:t>
+              <a:t>6/6/24</a:t>
             </a:fld>
             <a:endParaRPr lang="en-US"/>
           </a:p>
@@ -1870,7 +1870,7 @@
     </p:spTree>
     <p:extLst>
       <p:ext uri="{BB962C8B-B14F-4D97-AF65-F5344CB8AC3E}">
-        <p14:creationId xmlns:p14="http://schemas.microsoft.com/office/powerpoint/2010/main" val="167348182"/>
+        <p14:creationId xmlns:p14="http://schemas.microsoft.com/office/powerpoint/2010/main" val="810262360"/>
       </p:ext>
     </p:extLst>
   </p:cSld>
@@ -1909,15 +1909,15 @@
         </p:nvSpPr>
         <p:spPr>
           <a:xfrm>
-            <a:off x="937217" y="1767840"/>
-            <a:ext cx="4388438" cy="6187440"/>
+            <a:off x="937217" y="585258"/>
+            <a:ext cx="4388438" cy="2048404"/>
           </a:xfrm>
         </p:spPr>
         <p:txBody>
           <a:bodyPr anchor="b"/>
           <a:lstStyle>
             <a:lvl1pPr>
-              <a:defRPr sz="4762"/>
+              <a:defRPr sz="4096"/>
             </a:lvl1pPr>
           </a:lstStyle>
           <a:p>
@@ -1941,39 +1941,39 @@
         </p:nvSpPr>
         <p:spPr>
           <a:xfrm>
-            <a:off x="5784519" y="3818049"/>
-            <a:ext cx="6888272" cy="18844683"/>
+            <a:off x="5784519" y="1263997"/>
+            <a:ext cx="6888272" cy="6238691"/>
           </a:xfrm>
         </p:spPr>
         <p:txBody>
           <a:bodyPr/>
           <a:lstStyle>
             <a:lvl1pPr>
-              <a:defRPr sz="4762"/>
+              <a:defRPr sz="4096"/>
             </a:lvl1pPr>
             <a:lvl2pPr>
-              <a:defRPr sz="4166"/>
+              <a:defRPr sz="3584"/>
             </a:lvl2pPr>
             <a:lvl3pPr>
-              <a:defRPr sz="3571"/>
+              <a:defRPr sz="3072"/>
             </a:lvl3pPr>
             <a:lvl4pPr>
-              <a:defRPr sz="2976"/>
+              <a:defRPr sz="2560"/>
             </a:lvl4pPr>
             <a:lvl5pPr>
-              <a:defRPr sz="2976"/>
+              <a:defRPr sz="2560"/>
             </a:lvl5pPr>
             <a:lvl6pPr>
-              <a:defRPr sz="2976"/>
+              <a:defRPr sz="2560"/>
             </a:lvl6pPr>
             <a:lvl7pPr>
-              <a:defRPr sz="2976"/>
+              <a:defRPr sz="2560"/>
             </a:lvl7pPr>
             <a:lvl8pPr>
-              <a:defRPr sz="2976"/>
+              <a:defRPr sz="2560"/>
             </a:lvl8pPr>
             <a:lvl9pPr>
-              <a:defRPr sz="2976"/>
+              <a:defRPr sz="2560"/>
             </a:lvl9pPr>
           </a:lstStyle>
           <a:p>
@@ -2026,8 +2026,8 @@
         </p:nvSpPr>
         <p:spPr>
           <a:xfrm>
-            <a:off x="937217" y="7955280"/>
-            <a:ext cx="4388438" cy="14738140"/>
+            <a:off x="937217" y="2633662"/>
+            <a:ext cx="4388438" cy="4879186"/>
           </a:xfrm>
         </p:spPr>
         <p:txBody>
@@ -2035,39 +2035,39 @@
           <a:lstStyle>
             <a:lvl1pPr marL="0" indent="0">
               <a:buNone/>
-              <a:defRPr sz="2381"/>
+              <a:defRPr sz="2048"/>
             </a:lvl1pPr>
-            <a:lvl2pPr marL="680314" indent="0">
-              <a:buNone/>
-              <a:defRPr sz="2083"/>
+            <a:lvl2pPr marL="585262" indent="0">
+              <a:buNone/>
+              <a:defRPr sz="1792"/>
             </a:lvl2pPr>
-            <a:lvl3pPr marL="1360627" indent="0">
-              <a:buNone/>
-              <a:defRPr sz="1786"/>
+            <a:lvl3pPr marL="1170523" indent="0">
+              <a:buNone/>
+              <a:defRPr sz="1536"/>
             </a:lvl3pPr>
-            <a:lvl4pPr marL="2040941" indent="0">
-              <a:buNone/>
-              <a:defRPr sz="1488"/>
+            <a:lvl4pPr marL="1755785" indent="0">
+              <a:buNone/>
+              <a:defRPr sz="1280"/>
             </a:lvl4pPr>
-            <a:lvl5pPr marL="2721254" indent="0">
-              <a:buNone/>
-              <a:defRPr sz="1488"/>
+            <a:lvl5pPr marL="2341047" indent="0">
+              <a:buNone/>
+              <a:defRPr sz="1280"/>
             </a:lvl5pPr>
-            <a:lvl6pPr marL="3401568" indent="0">
-              <a:buNone/>
-              <a:defRPr sz="1488"/>
+            <a:lvl6pPr marL="2926309" indent="0">
+              <a:buNone/>
+              <a:defRPr sz="1280"/>
             </a:lvl6pPr>
-            <a:lvl7pPr marL="4081882" indent="0">
-              <a:buNone/>
-              <a:defRPr sz="1488"/>
+            <a:lvl7pPr marL="3511570" indent="0">
+              <a:buNone/>
+              <a:defRPr sz="1280"/>
             </a:lvl7pPr>
-            <a:lvl8pPr marL="4762195" indent="0">
-              <a:buNone/>
-              <a:defRPr sz="1488"/>
+            <a:lvl8pPr marL="4096832" indent="0">
+              <a:buNone/>
+              <a:defRPr sz="1280"/>
             </a:lvl8pPr>
-            <a:lvl9pPr marL="5442509" indent="0">
-              <a:buNone/>
-              <a:defRPr sz="1488"/>
+            <a:lvl9pPr marL="4682094" indent="0">
+              <a:buNone/>
+              <a:defRPr sz="1280"/>
             </a:lvl9pPr>
           </a:lstStyle>
           <a:p>
@@ -2096,7 +2096,7 @@
           <a:p>
             <a:fld id="{CFC60B5F-2253-DF41-8690-61B53F1555CE}" type="datetimeFigureOut">
               <a:rPr lang="en-US" smtClean="0"/>
-              <a:t>5/20/24</a:t>
+              <a:t>6/6/24</a:t>
             </a:fld>
             <a:endParaRPr lang="en-US"/>
           </a:p>
@@ -2147,7 +2147,7 @@
     </p:spTree>
     <p:extLst>
       <p:ext uri="{BB962C8B-B14F-4D97-AF65-F5344CB8AC3E}">
-        <p14:creationId xmlns:p14="http://schemas.microsoft.com/office/powerpoint/2010/main" val="268292263"/>
+        <p14:creationId xmlns:p14="http://schemas.microsoft.com/office/powerpoint/2010/main" val="4097194843"/>
       </p:ext>
     </p:extLst>
   </p:cSld>
@@ -2186,15 +2186,15 @@
         </p:nvSpPr>
         <p:spPr>
           <a:xfrm>
-            <a:off x="937217" y="1767840"/>
-            <a:ext cx="4388438" cy="6187440"/>
+            <a:off x="937217" y="585258"/>
+            <a:ext cx="4388438" cy="2048404"/>
           </a:xfrm>
         </p:spPr>
         <p:txBody>
           <a:bodyPr anchor="b"/>
           <a:lstStyle>
             <a:lvl1pPr>
-              <a:defRPr sz="4762"/>
+              <a:defRPr sz="4096"/>
             </a:lvl1pPr>
           </a:lstStyle>
           <a:p>
@@ -2218,8 +2218,8 @@
         </p:nvSpPr>
         <p:spPr>
           <a:xfrm>
-            <a:off x="5784519" y="3818049"/>
-            <a:ext cx="6888272" cy="18844683"/>
+            <a:off x="5784519" y="1263997"/>
+            <a:ext cx="6888272" cy="6238691"/>
           </a:xfrm>
         </p:spPr>
         <p:txBody>
@@ -2227,39 +2227,39 @@
           <a:lstStyle>
             <a:lvl1pPr marL="0" indent="0">
               <a:buNone/>
-              <a:defRPr sz="4762"/>
+              <a:defRPr sz="4096"/>
             </a:lvl1pPr>
-            <a:lvl2pPr marL="680314" indent="0">
-              <a:buNone/>
-              <a:defRPr sz="4166"/>
+            <a:lvl2pPr marL="585262" indent="0">
+              <a:buNone/>
+              <a:defRPr sz="3584"/>
             </a:lvl2pPr>
-            <a:lvl3pPr marL="1360627" indent="0">
-              <a:buNone/>
-              <a:defRPr sz="3571"/>
+            <a:lvl3pPr marL="1170523" indent="0">
+              <a:buNone/>
+              <a:defRPr sz="3072"/>
             </a:lvl3pPr>
-            <a:lvl4pPr marL="2040941" indent="0">
-              <a:buNone/>
-              <a:defRPr sz="2976"/>
+            <a:lvl4pPr marL="1755785" indent="0">
+              <a:buNone/>
+              <a:defRPr sz="2560"/>
             </a:lvl4pPr>
-            <a:lvl5pPr marL="2721254" indent="0">
-              <a:buNone/>
-              <a:defRPr sz="2976"/>
+            <a:lvl5pPr marL="2341047" indent="0">
+              <a:buNone/>
+              <a:defRPr sz="2560"/>
             </a:lvl5pPr>
-            <a:lvl6pPr marL="3401568" indent="0">
-              <a:buNone/>
-              <a:defRPr sz="2976"/>
+            <a:lvl6pPr marL="2926309" indent="0">
+              <a:buNone/>
+              <a:defRPr sz="2560"/>
             </a:lvl6pPr>
-            <a:lvl7pPr marL="4081882" indent="0">
-              <a:buNone/>
-              <a:defRPr sz="2976"/>
+            <a:lvl7pPr marL="3511570" indent="0">
+              <a:buNone/>
+              <a:defRPr sz="2560"/>
             </a:lvl7pPr>
-            <a:lvl8pPr marL="4762195" indent="0">
-              <a:buNone/>
-              <a:defRPr sz="2976"/>
+            <a:lvl8pPr marL="4096832" indent="0">
+              <a:buNone/>
+              <a:defRPr sz="2560"/>
             </a:lvl8pPr>
-            <a:lvl9pPr marL="5442509" indent="0">
-              <a:buNone/>
-              <a:defRPr sz="2976"/>
+            <a:lvl9pPr marL="4682094" indent="0">
+              <a:buNone/>
+              <a:defRPr sz="2560"/>
             </a:lvl9pPr>
           </a:lstStyle>
           <a:p>
@@ -2283,8 +2283,8 @@
         </p:nvSpPr>
         <p:spPr>
           <a:xfrm>
-            <a:off x="937217" y="7955280"/>
-            <a:ext cx="4388438" cy="14738140"/>
+            <a:off x="937217" y="2633662"/>
+            <a:ext cx="4388438" cy="4879186"/>
           </a:xfrm>
         </p:spPr>
         <p:txBody>
@@ -2292,39 +2292,39 @@
           <a:lstStyle>
             <a:lvl1pPr marL="0" indent="0">
               <a:buNone/>
-              <a:defRPr sz="2381"/>
+              <a:defRPr sz="2048"/>
             </a:lvl1pPr>
-            <a:lvl2pPr marL="680314" indent="0">
-              <a:buNone/>
-              <a:defRPr sz="2083"/>
+            <a:lvl2pPr marL="585262" indent="0">
+              <a:buNone/>
+              <a:defRPr sz="1792"/>
             </a:lvl2pPr>
-            <a:lvl3pPr marL="1360627" indent="0">
-              <a:buNone/>
-              <a:defRPr sz="1786"/>
+            <a:lvl3pPr marL="1170523" indent="0">
+              <a:buNone/>
+              <a:defRPr sz="1536"/>
             </a:lvl3pPr>
-            <a:lvl4pPr marL="2040941" indent="0">
-              <a:buNone/>
-              <a:defRPr sz="1488"/>
+            <a:lvl4pPr marL="1755785" indent="0">
+              <a:buNone/>
+              <a:defRPr sz="1280"/>
             </a:lvl4pPr>
-            <a:lvl5pPr marL="2721254" indent="0">
-              <a:buNone/>
-              <a:defRPr sz="1488"/>
+            <a:lvl5pPr marL="2341047" indent="0">
+              <a:buNone/>
+              <a:defRPr sz="1280"/>
             </a:lvl5pPr>
-            <a:lvl6pPr marL="3401568" indent="0">
-              <a:buNone/>
-              <a:defRPr sz="1488"/>
+            <a:lvl6pPr marL="2926309" indent="0">
+              <a:buNone/>
+              <a:defRPr sz="1280"/>
             </a:lvl6pPr>
-            <a:lvl7pPr marL="4081882" indent="0">
-              <a:buNone/>
-              <a:defRPr sz="1488"/>
+            <a:lvl7pPr marL="3511570" indent="0">
+              <a:buNone/>
+              <a:defRPr sz="1280"/>
             </a:lvl7pPr>
-            <a:lvl8pPr marL="4762195" indent="0">
-              <a:buNone/>
-              <a:defRPr sz="1488"/>
+            <a:lvl8pPr marL="4096832" indent="0">
+              <a:buNone/>
+              <a:defRPr sz="1280"/>
             </a:lvl8pPr>
-            <a:lvl9pPr marL="5442509" indent="0">
-              <a:buNone/>
-              <a:defRPr sz="1488"/>
+            <a:lvl9pPr marL="4682094" indent="0">
+              <a:buNone/>
+              <a:defRPr sz="1280"/>
             </a:lvl9pPr>
           </a:lstStyle>
           <a:p>
@@ -2353,7 +2353,7 @@
           <a:p>
             <a:fld id="{CFC60B5F-2253-DF41-8690-61B53F1555CE}" type="datetimeFigureOut">
               <a:rPr lang="en-US" smtClean="0"/>
-              <a:t>5/20/24</a:t>
+              <a:t>6/6/24</a:t>
             </a:fld>
             <a:endParaRPr lang="en-US"/>
           </a:p>
@@ -2404,7 +2404,7 @@
     </p:spTree>
     <p:extLst>
       <p:ext uri="{BB962C8B-B14F-4D97-AF65-F5344CB8AC3E}">
-        <p14:creationId xmlns:p14="http://schemas.microsoft.com/office/powerpoint/2010/main" val="2759360544"/>
+        <p14:creationId xmlns:p14="http://schemas.microsoft.com/office/powerpoint/2010/main" val="2184436162"/>
       </p:ext>
     </p:extLst>
   </p:cSld>
@@ -2448,8 +2448,8 @@
         </p:nvSpPr>
         <p:spPr>
           <a:xfrm>
-            <a:off x="935445" y="1411823"/>
-            <a:ext cx="11735574" cy="5125510"/>
+            <a:off x="935445" y="467396"/>
+            <a:ext cx="11735574" cy="1696843"/>
           </a:xfrm>
           <a:prstGeom prst="rect">
             <a:avLst/>
@@ -2481,8 +2481,8 @@
         </p:nvSpPr>
         <p:spPr>
           <a:xfrm>
-            <a:off x="935445" y="7059083"/>
-            <a:ext cx="11735574" cy="16825174"/>
+            <a:off x="935445" y="2336969"/>
+            <a:ext cx="11735574" cy="5570116"/>
           </a:xfrm>
           <a:prstGeom prst="rect">
             <a:avLst/>
@@ -2543,8 +2543,8 @@
         </p:nvSpPr>
         <p:spPr>
           <a:xfrm>
-            <a:off x="935444" y="24577892"/>
-            <a:ext cx="3061454" cy="1411817"/>
+            <a:off x="935444" y="8136718"/>
+            <a:ext cx="3061454" cy="467394"/>
           </a:xfrm>
           <a:prstGeom prst="rect">
             <a:avLst/>
@@ -2554,7 +2554,7 @@
           <a:bodyPr vert="horz" lIns="91440" tIns="45720" rIns="91440" bIns="45720" rtlCol="0" anchor="ctr"/>
           <a:lstStyle>
             <a:lvl1pPr algn="l">
-              <a:defRPr sz="1786">
+              <a:defRPr sz="1536">
                 <a:solidFill>
                   <a:schemeClr val="tx1">
                     <a:tint val="75000"/>
@@ -2566,7 +2566,7 @@
           <a:p>
             <a:fld id="{CFC60B5F-2253-DF41-8690-61B53F1555CE}" type="datetimeFigureOut">
               <a:rPr lang="en-US" smtClean="0"/>
-              <a:t>5/20/24</a:t>
+              <a:t>6/6/24</a:t>
             </a:fld>
             <a:endParaRPr lang="en-US"/>
           </a:p>
@@ -2584,8 +2584,8 @@
         </p:nvSpPr>
         <p:spPr>
           <a:xfrm>
-            <a:off x="4507141" y="24577892"/>
-            <a:ext cx="4592181" cy="1411817"/>
+            <a:off x="4507141" y="8136718"/>
+            <a:ext cx="4592181" cy="467394"/>
           </a:xfrm>
           <a:prstGeom prst="rect">
             <a:avLst/>
@@ -2595,7 +2595,7 @@
           <a:bodyPr vert="horz" lIns="91440" tIns="45720" rIns="91440" bIns="45720" rtlCol="0" anchor="ctr"/>
           <a:lstStyle>
             <a:lvl1pPr algn="ctr">
-              <a:defRPr sz="1786">
+              <a:defRPr sz="1536">
                 <a:solidFill>
                   <a:schemeClr val="tx1">
                     <a:tint val="75000"/>
@@ -2621,8 +2621,8 @@
         </p:nvSpPr>
         <p:spPr>
           <a:xfrm>
-            <a:off x="9609565" y="24577892"/>
-            <a:ext cx="3061454" cy="1411817"/>
+            <a:off x="9609565" y="8136718"/>
+            <a:ext cx="3061454" cy="467394"/>
           </a:xfrm>
           <a:prstGeom prst="rect">
             <a:avLst/>
@@ -2632,7 +2632,7 @@
           <a:bodyPr vert="horz" lIns="91440" tIns="45720" rIns="91440" bIns="45720" rtlCol="0" anchor="ctr"/>
           <a:lstStyle>
             <a:lvl1pPr algn="r">
-              <a:defRPr sz="1786">
+              <a:defRPr sz="1536">
                 <a:solidFill>
                   <a:schemeClr val="tx1">
                     <a:tint val="75000"/>
@@ -2653,27 +2653,27 @@
     </p:spTree>
     <p:extLst>
       <p:ext uri="{BB962C8B-B14F-4D97-AF65-F5344CB8AC3E}">
-        <p14:creationId xmlns:p14="http://schemas.microsoft.com/office/powerpoint/2010/main" val="3585848202"/>
+        <p14:creationId xmlns:p14="http://schemas.microsoft.com/office/powerpoint/2010/main" val="4049545787"/>
       </p:ext>
     </p:extLst>
   </p:cSld>
   <p:clrMap bg1="lt1" tx1="dk1" bg2="lt2" tx2="dk2" accent1="accent1" accent2="accent2" accent3="accent3" accent4="accent4" accent5="accent5" accent6="accent6" hlink="hlink" folHlink="folHlink"/>
   <p:sldLayoutIdLst>
-    <p:sldLayoutId id="2147483841" r:id="rId1"/>
-    <p:sldLayoutId id="2147483842" r:id="rId2"/>
-    <p:sldLayoutId id="2147483843" r:id="rId3"/>
-    <p:sldLayoutId id="2147483844" r:id="rId4"/>
-    <p:sldLayoutId id="2147483845" r:id="rId5"/>
-    <p:sldLayoutId id="2147483846" r:id="rId6"/>
-    <p:sldLayoutId id="2147483847" r:id="rId7"/>
-    <p:sldLayoutId id="2147483848" r:id="rId8"/>
-    <p:sldLayoutId id="2147483849" r:id="rId9"/>
-    <p:sldLayoutId id="2147483850" r:id="rId10"/>
-    <p:sldLayoutId id="2147483851" r:id="rId11"/>
+    <p:sldLayoutId id="2147483853" r:id="rId1"/>
+    <p:sldLayoutId id="2147483854" r:id="rId2"/>
+    <p:sldLayoutId id="2147483855" r:id="rId3"/>
+    <p:sldLayoutId id="2147483856" r:id="rId4"/>
+    <p:sldLayoutId id="2147483857" r:id="rId5"/>
+    <p:sldLayoutId id="2147483858" r:id="rId6"/>
+    <p:sldLayoutId id="2147483859" r:id="rId7"/>
+    <p:sldLayoutId id="2147483860" r:id="rId8"/>
+    <p:sldLayoutId id="2147483861" r:id="rId9"/>
+    <p:sldLayoutId id="2147483862" r:id="rId10"/>
+    <p:sldLayoutId id="2147483863" r:id="rId11"/>
   </p:sldLayoutIdLst>
   <p:txStyles>
     <p:titleStyle>
-      <a:lvl1pPr algn="l" defTabSz="1360627" rtl="0" eaLnBrk="1" latinLnBrk="0" hangingPunct="1">
+      <a:lvl1pPr algn="l" defTabSz="1170523" rtl="0" eaLnBrk="1" latinLnBrk="0" hangingPunct="1">
         <a:lnSpc>
           <a:spcPct val="90000"/>
         </a:lnSpc>
@@ -2681,7 +2681,7 @@
           <a:spcPct val="0"/>
         </a:spcBef>
         <a:buNone/>
-        <a:defRPr sz="6547" kern="1200">
+        <a:defRPr sz="5632" kern="1200">
           <a:solidFill>
             <a:schemeClr val="tx1"/>
           </a:solidFill>
@@ -2692,16 +2692,16 @@
       </a:lvl1pPr>
     </p:titleStyle>
     <p:bodyStyle>
-      <a:lvl1pPr marL="340157" indent="-340157" algn="l" defTabSz="1360627" rtl="0" eaLnBrk="1" latinLnBrk="0" hangingPunct="1">
+      <a:lvl1pPr marL="292631" indent="-292631" algn="l" defTabSz="1170523" rtl="0" eaLnBrk="1" latinLnBrk="0" hangingPunct="1">
         <a:lnSpc>
           <a:spcPct val="90000"/>
         </a:lnSpc>
         <a:spcBef>
-          <a:spcPts val="1488"/>
+          <a:spcPts val="1280"/>
         </a:spcBef>
         <a:buFont typeface="Arial" panose="020B0604020202020204" pitchFamily="34" charset="0"/>
         <a:buChar char="•"/>
-        <a:defRPr sz="4166" kern="1200">
+        <a:defRPr sz="3584" kern="1200">
           <a:solidFill>
             <a:schemeClr val="tx1"/>
           </a:solidFill>
@@ -2710,16 +2710,16 @@
           <a:cs typeface="+mn-cs"/>
         </a:defRPr>
       </a:lvl1pPr>
-      <a:lvl2pPr marL="1020470" indent="-340157" algn="l" defTabSz="1360627" rtl="0" eaLnBrk="1" latinLnBrk="0" hangingPunct="1">
+      <a:lvl2pPr marL="877893" indent="-292631" algn="l" defTabSz="1170523" rtl="0" eaLnBrk="1" latinLnBrk="0" hangingPunct="1">
         <a:lnSpc>
           <a:spcPct val="90000"/>
         </a:lnSpc>
         <a:spcBef>
-          <a:spcPts val="744"/>
+          <a:spcPts val="640"/>
         </a:spcBef>
         <a:buFont typeface="Arial" panose="020B0604020202020204" pitchFamily="34" charset="0"/>
         <a:buChar char="•"/>
-        <a:defRPr sz="3571" kern="1200">
+        <a:defRPr sz="3072" kern="1200">
           <a:solidFill>
             <a:schemeClr val="tx1"/>
           </a:solidFill>
@@ -2728,16 +2728,16 @@
           <a:cs typeface="+mn-cs"/>
         </a:defRPr>
       </a:lvl2pPr>
-      <a:lvl3pPr marL="1700784" indent="-340157" algn="l" defTabSz="1360627" rtl="0" eaLnBrk="1" latinLnBrk="0" hangingPunct="1">
+      <a:lvl3pPr marL="1463154" indent="-292631" algn="l" defTabSz="1170523" rtl="0" eaLnBrk="1" latinLnBrk="0" hangingPunct="1">
         <a:lnSpc>
           <a:spcPct val="90000"/>
         </a:lnSpc>
         <a:spcBef>
-          <a:spcPts val="744"/>
+          <a:spcPts val="640"/>
         </a:spcBef>
         <a:buFont typeface="Arial" panose="020B0604020202020204" pitchFamily="34" charset="0"/>
         <a:buChar char="•"/>
-        <a:defRPr sz="2976" kern="1200">
+        <a:defRPr sz="2560" kern="1200">
           <a:solidFill>
             <a:schemeClr val="tx1"/>
           </a:solidFill>
@@ -2746,16 +2746,16 @@
           <a:cs typeface="+mn-cs"/>
         </a:defRPr>
       </a:lvl3pPr>
-      <a:lvl4pPr marL="2381098" indent="-340157" algn="l" defTabSz="1360627" rtl="0" eaLnBrk="1" latinLnBrk="0" hangingPunct="1">
+      <a:lvl4pPr marL="2048416" indent="-292631" algn="l" defTabSz="1170523" rtl="0" eaLnBrk="1" latinLnBrk="0" hangingPunct="1">
         <a:lnSpc>
           <a:spcPct val="90000"/>
         </a:lnSpc>
         <a:spcBef>
-          <a:spcPts val="744"/>
+          <a:spcPts val="640"/>
         </a:spcBef>
         <a:buFont typeface="Arial" panose="020B0604020202020204" pitchFamily="34" charset="0"/>
         <a:buChar char="•"/>
-        <a:defRPr sz="2678" kern="1200">
+        <a:defRPr sz="2304" kern="1200">
           <a:solidFill>
             <a:schemeClr val="tx1"/>
           </a:solidFill>
@@ -2764,16 +2764,16 @@
           <a:cs typeface="+mn-cs"/>
         </a:defRPr>
       </a:lvl4pPr>
-      <a:lvl5pPr marL="3061411" indent="-340157" algn="l" defTabSz="1360627" rtl="0" eaLnBrk="1" latinLnBrk="0" hangingPunct="1">
+      <a:lvl5pPr marL="2633678" indent="-292631" algn="l" defTabSz="1170523" rtl="0" eaLnBrk="1" latinLnBrk="0" hangingPunct="1">
         <a:lnSpc>
           <a:spcPct val="90000"/>
         </a:lnSpc>
         <a:spcBef>
-          <a:spcPts val="744"/>
+          <a:spcPts val="640"/>
         </a:spcBef>
         <a:buFont typeface="Arial" panose="020B0604020202020204" pitchFamily="34" charset="0"/>
         <a:buChar char="•"/>
-        <a:defRPr sz="2678" kern="1200">
+        <a:defRPr sz="2304" kern="1200">
           <a:solidFill>
             <a:schemeClr val="tx1"/>
           </a:solidFill>
@@ -2782,16 +2782,16 @@
           <a:cs typeface="+mn-cs"/>
         </a:defRPr>
       </a:lvl5pPr>
-      <a:lvl6pPr marL="3741725" indent="-340157" algn="l" defTabSz="1360627" rtl="0" eaLnBrk="1" latinLnBrk="0" hangingPunct="1">
+      <a:lvl6pPr marL="3218939" indent="-292631" algn="l" defTabSz="1170523" rtl="0" eaLnBrk="1" latinLnBrk="0" hangingPunct="1">
         <a:lnSpc>
           <a:spcPct val="90000"/>
         </a:lnSpc>
         <a:spcBef>
-          <a:spcPts val="744"/>
+          <a:spcPts val="640"/>
         </a:spcBef>
         <a:buFont typeface="Arial" panose="020B0604020202020204" pitchFamily="34" charset="0"/>
         <a:buChar char="•"/>
-        <a:defRPr sz="2678" kern="1200">
+        <a:defRPr sz="2304" kern="1200">
           <a:solidFill>
             <a:schemeClr val="tx1"/>
           </a:solidFill>
@@ -2800,16 +2800,16 @@
           <a:cs typeface="+mn-cs"/>
         </a:defRPr>
       </a:lvl6pPr>
-      <a:lvl7pPr marL="4422038" indent="-340157" algn="l" defTabSz="1360627" rtl="0" eaLnBrk="1" latinLnBrk="0" hangingPunct="1">
+      <a:lvl7pPr marL="3804201" indent="-292631" algn="l" defTabSz="1170523" rtl="0" eaLnBrk="1" latinLnBrk="0" hangingPunct="1">
         <a:lnSpc>
           <a:spcPct val="90000"/>
         </a:lnSpc>
         <a:spcBef>
-          <a:spcPts val="744"/>
+          <a:spcPts val="640"/>
         </a:spcBef>
         <a:buFont typeface="Arial" panose="020B0604020202020204" pitchFamily="34" charset="0"/>
         <a:buChar char="•"/>
-        <a:defRPr sz="2678" kern="1200">
+        <a:defRPr sz="2304" kern="1200">
           <a:solidFill>
             <a:schemeClr val="tx1"/>
           </a:solidFill>
@@ -2818,16 +2818,16 @@
           <a:cs typeface="+mn-cs"/>
         </a:defRPr>
       </a:lvl7pPr>
-      <a:lvl8pPr marL="5102352" indent="-340157" algn="l" defTabSz="1360627" rtl="0" eaLnBrk="1" latinLnBrk="0" hangingPunct="1">
+      <a:lvl8pPr marL="4389463" indent="-292631" algn="l" defTabSz="1170523" rtl="0" eaLnBrk="1" latinLnBrk="0" hangingPunct="1">
         <a:lnSpc>
           <a:spcPct val="90000"/>
         </a:lnSpc>
         <a:spcBef>
-          <a:spcPts val="744"/>
+          <a:spcPts val="640"/>
         </a:spcBef>
         <a:buFont typeface="Arial" panose="020B0604020202020204" pitchFamily="34" charset="0"/>
         <a:buChar char="•"/>
-        <a:defRPr sz="2678" kern="1200">
+        <a:defRPr sz="2304" kern="1200">
           <a:solidFill>
             <a:schemeClr val="tx1"/>
           </a:solidFill>
@@ -2836,16 +2836,16 @@
           <a:cs typeface="+mn-cs"/>
         </a:defRPr>
       </a:lvl8pPr>
-      <a:lvl9pPr marL="5782666" indent="-340157" algn="l" defTabSz="1360627" rtl="0" eaLnBrk="1" latinLnBrk="0" hangingPunct="1">
+      <a:lvl9pPr marL="4974725" indent="-292631" algn="l" defTabSz="1170523" rtl="0" eaLnBrk="1" latinLnBrk="0" hangingPunct="1">
         <a:lnSpc>
           <a:spcPct val="90000"/>
         </a:lnSpc>
         <a:spcBef>
-          <a:spcPts val="744"/>
+          <a:spcPts val="640"/>
         </a:spcBef>
         <a:buFont typeface="Arial" panose="020B0604020202020204" pitchFamily="34" charset="0"/>
         <a:buChar char="•"/>
-        <a:defRPr sz="2678" kern="1200">
+        <a:defRPr sz="2304" kern="1200">
           <a:solidFill>
             <a:schemeClr val="tx1"/>
           </a:solidFill>
@@ -2859,8 +2859,8 @@
       <a:defPPr>
         <a:defRPr lang="en-US"/>
       </a:defPPr>
-      <a:lvl1pPr marL="0" algn="l" defTabSz="1360627" rtl="0" eaLnBrk="1" latinLnBrk="0" hangingPunct="1">
-        <a:defRPr sz="2678" kern="1200">
+      <a:lvl1pPr marL="0" algn="l" defTabSz="1170523" rtl="0" eaLnBrk="1" latinLnBrk="0" hangingPunct="1">
+        <a:defRPr sz="2304" kern="1200">
           <a:solidFill>
             <a:schemeClr val="tx1"/>
           </a:solidFill>
@@ -2869,8 +2869,8 @@
           <a:cs typeface="+mn-cs"/>
         </a:defRPr>
       </a:lvl1pPr>
-      <a:lvl2pPr marL="680314" algn="l" defTabSz="1360627" rtl="0" eaLnBrk="1" latinLnBrk="0" hangingPunct="1">
-        <a:defRPr sz="2678" kern="1200">
+      <a:lvl2pPr marL="585262" algn="l" defTabSz="1170523" rtl="0" eaLnBrk="1" latinLnBrk="0" hangingPunct="1">
+        <a:defRPr sz="2304" kern="1200">
           <a:solidFill>
             <a:schemeClr val="tx1"/>
           </a:solidFill>
@@ -2879,8 +2879,8 @@
           <a:cs typeface="+mn-cs"/>
         </a:defRPr>
       </a:lvl2pPr>
-      <a:lvl3pPr marL="1360627" algn="l" defTabSz="1360627" rtl="0" eaLnBrk="1" latinLnBrk="0" hangingPunct="1">
-        <a:defRPr sz="2678" kern="1200">
+      <a:lvl3pPr marL="1170523" algn="l" defTabSz="1170523" rtl="0" eaLnBrk="1" latinLnBrk="0" hangingPunct="1">
+        <a:defRPr sz="2304" kern="1200">
           <a:solidFill>
             <a:schemeClr val="tx1"/>
           </a:solidFill>
@@ -2889,8 +2889,8 @@
           <a:cs typeface="+mn-cs"/>
         </a:defRPr>
       </a:lvl3pPr>
-      <a:lvl4pPr marL="2040941" algn="l" defTabSz="1360627" rtl="0" eaLnBrk="1" latinLnBrk="0" hangingPunct="1">
-        <a:defRPr sz="2678" kern="1200">
+      <a:lvl4pPr marL="1755785" algn="l" defTabSz="1170523" rtl="0" eaLnBrk="1" latinLnBrk="0" hangingPunct="1">
+        <a:defRPr sz="2304" kern="1200">
           <a:solidFill>
             <a:schemeClr val="tx1"/>
           </a:solidFill>
@@ -2899,8 +2899,8 @@
           <a:cs typeface="+mn-cs"/>
         </a:defRPr>
       </a:lvl4pPr>
-      <a:lvl5pPr marL="2721254" algn="l" defTabSz="1360627" rtl="0" eaLnBrk="1" latinLnBrk="0" hangingPunct="1">
-        <a:defRPr sz="2678" kern="1200">
+      <a:lvl5pPr marL="2341047" algn="l" defTabSz="1170523" rtl="0" eaLnBrk="1" latinLnBrk="0" hangingPunct="1">
+        <a:defRPr sz="2304" kern="1200">
           <a:solidFill>
             <a:schemeClr val="tx1"/>
           </a:solidFill>
@@ -2909,8 +2909,8 @@
           <a:cs typeface="+mn-cs"/>
         </a:defRPr>
       </a:lvl5pPr>
-      <a:lvl6pPr marL="3401568" algn="l" defTabSz="1360627" rtl="0" eaLnBrk="1" latinLnBrk="0" hangingPunct="1">
-        <a:defRPr sz="2678" kern="1200">
+      <a:lvl6pPr marL="2926309" algn="l" defTabSz="1170523" rtl="0" eaLnBrk="1" latinLnBrk="0" hangingPunct="1">
+        <a:defRPr sz="2304" kern="1200">
           <a:solidFill>
             <a:schemeClr val="tx1"/>
           </a:solidFill>
@@ -2919,8 +2919,8 @@
           <a:cs typeface="+mn-cs"/>
         </a:defRPr>
       </a:lvl6pPr>
-      <a:lvl7pPr marL="4081882" algn="l" defTabSz="1360627" rtl="0" eaLnBrk="1" latinLnBrk="0" hangingPunct="1">
-        <a:defRPr sz="2678" kern="1200">
+      <a:lvl7pPr marL="3511570" algn="l" defTabSz="1170523" rtl="0" eaLnBrk="1" latinLnBrk="0" hangingPunct="1">
+        <a:defRPr sz="2304" kern="1200">
           <a:solidFill>
             <a:schemeClr val="tx1"/>
           </a:solidFill>
@@ -2929,8 +2929,8 @@
           <a:cs typeface="+mn-cs"/>
         </a:defRPr>
       </a:lvl7pPr>
-      <a:lvl8pPr marL="4762195" algn="l" defTabSz="1360627" rtl="0" eaLnBrk="1" latinLnBrk="0" hangingPunct="1">
-        <a:defRPr sz="2678" kern="1200">
+      <a:lvl8pPr marL="4096832" algn="l" defTabSz="1170523" rtl="0" eaLnBrk="1" latinLnBrk="0" hangingPunct="1">
+        <a:defRPr sz="2304" kern="1200">
           <a:solidFill>
             <a:schemeClr val="tx1"/>
           </a:solidFill>
@@ -2939,8 +2939,8 @@
           <a:cs typeface="+mn-cs"/>
         </a:defRPr>
       </a:lvl8pPr>
-      <a:lvl9pPr marL="5442509" algn="l" defTabSz="1360627" rtl="0" eaLnBrk="1" latinLnBrk="0" hangingPunct="1">
-        <a:defRPr sz="2678" kern="1200">
+      <a:lvl9pPr marL="4682094" algn="l" defTabSz="1170523" rtl="0" eaLnBrk="1" latinLnBrk="0" hangingPunct="1">
+        <a:defRPr sz="2304" kern="1200">
           <a:solidFill>
             <a:schemeClr val="tx1"/>
           </a:solidFill>
@@ -2985,7 +2985,7 @@
         </p:nvSpPr>
         <p:spPr>
           <a:xfrm rot="16200000">
-            <a:off x="-1972022" y="1959923"/>
+            <a:off x="-2025818" y="1967811"/>
             <a:ext cx="4381500" cy="461665"/>
           </a:xfrm>
           <a:prstGeom prst="rect">
@@ -3021,7 +3021,7 @@
         </p:nvSpPr>
         <p:spPr>
           <a:xfrm rot="16200000">
-            <a:off x="-1965970" y="6341423"/>
+            <a:off x="-2019766" y="6349311"/>
             <a:ext cx="4381500" cy="461665"/>
           </a:xfrm>
           <a:prstGeom prst="rect">
@@ -3043,82 +3043,6 @@
             <a:r>
               <a:rPr lang="en-US" sz="2400" b="1" u="sng" dirty="0"/>
               <a:t> (Saliency)</a:t>
-            </a:r>
-          </a:p>
-        </p:txBody>
-      </p:sp>
-      <p:sp>
-        <p:nvSpPr>
-          <p:cNvPr id="10" name="TextBox 9">
-            <a:extLst>
-              <a:ext uri="{FF2B5EF4-FFF2-40B4-BE49-F238E27FC236}">
-                <a16:creationId xmlns:a16="http://schemas.microsoft.com/office/drawing/2014/main" id="{2ABA556E-AFE0-CEA5-DFB2-E44B5456DAE4}"/>
-              </a:ext>
-            </a:extLst>
-          </p:cNvPr>
-          <p:cNvSpPr txBox="1"/>
-          <p:nvPr/>
-        </p:nvSpPr>
-        <p:spPr>
-          <a:xfrm rot="16200000">
-            <a:off x="-1959918" y="10722925"/>
-            <a:ext cx="4381500" cy="461665"/>
-          </a:xfrm>
-          <a:prstGeom prst="rect">
-            <a:avLst/>
-          </a:prstGeom>
-          <a:noFill/>
-        </p:spPr>
-        <p:txBody>
-          <a:bodyPr wrap="square" rtlCol="0">
-            <a:spAutoFit/>
-          </a:bodyPr>
-          <a:lstStyle/>
-          <a:p>
-            <a:pPr algn="ctr"/>
-            <a:r>
-              <a:rPr lang="en-US" sz="2400" b="1" u="sng" dirty="0" err="1"/>
-              <a:t>MinMax</a:t>
-            </a:r>
-            <a:r>
-              <a:rPr lang="en-US" sz="2400" b="1" u="sng" dirty="0"/>
-              <a:t> (Saliency)</a:t>
-            </a:r>
-          </a:p>
-        </p:txBody>
-      </p:sp>
-      <p:sp>
-        <p:nvSpPr>
-          <p:cNvPr id="12" name="TextBox 11">
-            <a:extLst>
-              <a:ext uri="{FF2B5EF4-FFF2-40B4-BE49-F238E27FC236}">
-                <a16:creationId xmlns:a16="http://schemas.microsoft.com/office/drawing/2014/main" id="{0444BC84-0EF8-94A5-777E-4C0B9A45018B}"/>
-              </a:ext>
-            </a:extLst>
-          </p:cNvPr>
-          <p:cNvSpPr txBox="1"/>
-          <p:nvPr/>
-        </p:nvSpPr>
-        <p:spPr>
-          <a:xfrm rot="16200000">
-            <a:off x="-1959918" y="15104425"/>
-            <a:ext cx="4381500" cy="461665"/>
-          </a:xfrm>
-          <a:prstGeom prst="rect">
-            <a:avLst/>
-          </a:prstGeom>
-          <a:noFill/>
-        </p:spPr>
-        <p:txBody>
-          <a:bodyPr wrap="square" rtlCol="0">
-            <a:spAutoFit/>
-          </a:bodyPr>
-          <a:lstStyle/>
-          <a:p>
-            <a:pPr algn="ctr"/>
-            <a:r>
-              <a:rPr lang="en-US" sz="2400" b="1" u="sng" dirty="0"/>
-              <a:t>X at Max P (Saliency)</a:t>
             </a:r>
           </a:p>
         </p:txBody>
@@ -3145,50 +3069,14 @@
         </p:blipFill>
         <p:spPr>
           <a:xfrm>
-            <a:off x="497977" y="-7888"/>
-            <a:ext cx="6578600" cy="4381500"/>
+            <a:off x="444182" y="0"/>
+            <a:ext cx="6590041" cy="4389120"/>
           </a:xfrm>
           <a:prstGeom prst="rect">
             <a:avLst/>
           </a:prstGeom>
         </p:spPr>
       </p:pic>
-      <p:sp>
-        <p:nvSpPr>
-          <p:cNvPr id="13" name="TextBox 12">
-            <a:extLst>
-              <a:ext uri="{FF2B5EF4-FFF2-40B4-BE49-F238E27FC236}">
-                <a16:creationId xmlns:a16="http://schemas.microsoft.com/office/drawing/2014/main" id="{1CE7EBC8-ACA2-2D66-7C1D-BCD0369322C0}"/>
-              </a:ext>
-            </a:extLst>
-          </p:cNvPr>
-          <p:cNvSpPr txBox="1"/>
-          <p:nvPr/>
-        </p:nvSpPr>
-        <p:spPr>
-          <a:xfrm rot="16200000">
-            <a:off x="-1959918" y="19485926"/>
-            <a:ext cx="4381500" cy="461665"/>
-          </a:xfrm>
-          <a:prstGeom prst="rect">
-            <a:avLst/>
-          </a:prstGeom>
-          <a:noFill/>
-        </p:spPr>
-        <p:txBody>
-          <a:bodyPr wrap="square" rtlCol="0">
-            <a:spAutoFit/>
-          </a:bodyPr>
-          <a:lstStyle/>
-          <a:p>
-            <a:pPr algn="ctr"/>
-            <a:r>
-              <a:rPr lang="en-US" sz="2400" b="1" u="sng" dirty="0"/>
-              <a:t>Expected Value (Bell 1985)</a:t>
-            </a:r>
-          </a:p>
-        </p:txBody>
-      </p:sp>
       <p:pic>
         <p:nvPicPr>
           <p:cNvPr id="6" name="Picture 5">
@@ -3211,58 +3099,14 @@
         </p:blipFill>
         <p:spPr>
           <a:xfrm>
-            <a:off x="7076577" y="0"/>
-            <a:ext cx="6548586" cy="4365724"/>
+            <a:off x="7022781" y="7888"/>
+            <a:ext cx="6583680" cy="4389120"/>
           </a:xfrm>
           <a:prstGeom prst="rect">
             <a:avLst/>
           </a:prstGeom>
         </p:spPr>
       </p:pic>
-      <p:sp>
-        <p:nvSpPr>
-          <p:cNvPr id="14" name="TextBox 13">
-            <a:extLst>
-              <a:ext uri="{FF2B5EF4-FFF2-40B4-BE49-F238E27FC236}">
-                <a16:creationId xmlns:a16="http://schemas.microsoft.com/office/drawing/2014/main" id="{98F16750-AC8B-0A07-0A19-F6CBA32E11C5}"/>
-              </a:ext>
-            </a:extLst>
-          </p:cNvPr>
-          <p:cNvSpPr txBox="1"/>
-          <p:nvPr/>
-        </p:nvSpPr>
-        <p:spPr>
-          <a:xfrm rot="16200000">
-            <a:off x="-1972022" y="23875120"/>
-            <a:ext cx="4381500" cy="446276"/>
-          </a:xfrm>
-          <a:prstGeom prst="rect">
-            <a:avLst/>
-          </a:prstGeom>
-          <a:noFill/>
-        </p:spPr>
-        <p:txBody>
-          <a:bodyPr wrap="square" rtlCol="0">
-            <a:spAutoFit/>
-          </a:bodyPr>
-          <a:lstStyle/>
-          <a:p>
-            <a:pPr algn="ctr"/>
-            <a:r>
-              <a:rPr lang="en-US" sz="2300" b="1" u="sng" dirty="0"/>
-              <a:t>Prospect Itself (</a:t>
-            </a:r>
-            <a:r>
-              <a:rPr lang="en-US" sz="2300" b="1" u="sng" dirty="0" err="1"/>
-              <a:t>Kozegi</a:t>
-            </a:r>
-            <a:r>
-              <a:rPr lang="en-US" sz="2300" b="1" u="sng" dirty="0"/>
-              <a:t>-Rabin CPE)</a:t>
-            </a:r>
-          </a:p>
-        </p:txBody>
-      </p:sp>
       <p:pic>
         <p:nvPicPr>
           <p:cNvPr id="15" name="Picture 14">
@@ -3285,8 +3129,8 @@
         </p:blipFill>
         <p:spPr>
           <a:xfrm>
-            <a:off x="497977" y="4368164"/>
-            <a:ext cx="6578600" cy="4381500"/>
+            <a:off x="444182" y="4376052"/>
+            <a:ext cx="6590041" cy="4389120"/>
           </a:xfrm>
           <a:prstGeom prst="rect">
             <a:avLst/>
@@ -3315,248 +3159,8 @@
         </p:blipFill>
         <p:spPr>
           <a:xfrm>
-            <a:off x="7076577" y="4365724"/>
-            <a:ext cx="6496898" cy="4331265"/>
-          </a:xfrm>
-          <a:prstGeom prst="rect">
-            <a:avLst/>
-          </a:prstGeom>
-        </p:spPr>
-      </p:pic>
-      <p:pic>
-        <p:nvPicPr>
-          <p:cNvPr id="23" name="Picture 22">
-            <a:extLst>
-              <a:ext uri="{FF2B5EF4-FFF2-40B4-BE49-F238E27FC236}">
-                <a16:creationId xmlns:a16="http://schemas.microsoft.com/office/drawing/2014/main" id="{2B9E5F36-1EA2-4E7E-C79F-42B0F3840D79}"/>
-              </a:ext>
-            </a:extLst>
-          </p:cNvPr>
-          <p:cNvPicPr>
-            <a:picLocks noChangeAspect="1"/>
-          </p:cNvPicPr>
-          <p:nvPr/>
-        </p:nvPicPr>
-        <p:blipFill>
-          <a:blip r:embed="rId6"/>
-          <a:stretch>
-            <a:fillRect/>
-          </a:stretch>
-        </p:blipFill>
-        <p:spPr>
-          <a:xfrm>
-            <a:off x="455613" y="8762978"/>
-            <a:ext cx="6578600" cy="4381500"/>
-          </a:xfrm>
-          <a:prstGeom prst="rect">
-            <a:avLst/>
-          </a:prstGeom>
-        </p:spPr>
-      </p:pic>
-      <p:pic>
-        <p:nvPicPr>
-          <p:cNvPr id="26" name="Picture 25">
-            <a:extLst>
-              <a:ext uri="{FF2B5EF4-FFF2-40B4-BE49-F238E27FC236}">
-                <a16:creationId xmlns:a16="http://schemas.microsoft.com/office/drawing/2014/main" id="{DBC9A40A-C634-764F-C3B1-71A23923D618}"/>
-              </a:ext>
-            </a:extLst>
-          </p:cNvPr>
-          <p:cNvPicPr>
-            <a:picLocks noChangeAspect="1"/>
-          </p:cNvPicPr>
-          <p:nvPr/>
-        </p:nvPicPr>
-        <p:blipFill>
-          <a:blip r:embed="rId7"/>
-          <a:stretch>
-            <a:fillRect/>
-          </a:stretch>
-        </p:blipFill>
-        <p:spPr>
-          <a:xfrm>
-            <a:off x="7088681" y="8747220"/>
-            <a:ext cx="6496898" cy="4331265"/>
-          </a:xfrm>
-          <a:prstGeom prst="rect">
-            <a:avLst/>
-          </a:prstGeom>
-        </p:spPr>
-      </p:pic>
-      <p:pic>
-        <p:nvPicPr>
-          <p:cNvPr id="28" name="Picture 27">
-            <a:extLst>
-              <a:ext uri="{FF2B5EF4-FFF2-40B4-BE49-F238E27FC236}">
-                <a16:creationId xmlns:a16="http://schemas.microsoft.com/office/drawing/2014/main" id="{40B49B7F-2D18-959B-2EEC-A8153142B6C9}"/>
-              </a:ext>
-            </a:extLst>
-          </p:cNvPr>
-          <p:cNvPicPr>
-            <a:picLocks noChangeAspect="1"/>
-          </p:cNvPicPr>
-          <p:nvPr/>
-        </p:nvPicPr>
-        <p:blipFill>
-          <a:blip r:embed="rId8"/>
-          <a:stretch>
-            <a:fillRect/>
-          </a:stretch>
-        </p:blipFill>
-        <p:spPr>
-          <a:xfrm>
-            <a:off x="467717" y="13078485"/>
-            <a:ext cx="6578600" cy="4381500"/>
-          </a:xfrm>
-          <a:prstGeom prst="rect">
-            <a:avLst/>
-          </a:prstGeom>
-        </p:spPr>
-      </p:pic>
-      <p:pic>
-        <p:nvPicPr>
-          <p:cNvPr id="32" name="Picture 31">
-            <a:extLst>
-              <a:ext uri="{FF2B5EF4-FFF2-40B4-BE49-F238E27FC236}">
-                <a16:creationId xmlns:a16="http://schemas.microsoft.com/office/drawing/2014/main" id="{84FB0799-2BCC-1CAF-103D-FD699A417685}"/>
-              </a:ext>
-            </a:extLst>
-          </p:cNvPr>
-          <p:cNvPicPr>
-            <a:picLocks noChangeAspect="1"/>
-          </p:cNvPicPr>
-          <p:nvPr/>
-        </p:nvPicPr>
-        <p:blipFill>
-          <a:blip r:embed="rId9"/>
-          <a:stretch>
-            <a:fillRect/>
-          </a:stretch>
-        </p:blipFill>
-        <p:spPr>
-          <a:xfrm>
-            <a:off x="7087168" y="13078485"/>
-            <a:ext cx="6496898" cy="4331265"/>
-          </a:xfrm>
-          <a:prstGeom prst="rect">
-            <a:avLst/>
-          </a:prstGeom>
-        </p:spPr>
-      </p:pic>
-      <p:pic>
-        <p:nvPicPr>
-          <p:cNvPr id="36" name="Picture 35">
-            <a:extLst>
-              <a:ext uri="{FF2B5EF4-FFF2-40B4-BE49-F238E27FC236}">
-                <a16:creationId xmlns:a16="http://schemas.microsoft.com/office/drawing/2014/main" id="{F3D4A290-CCF2-4544-B44C-1ADC22826B3C}"/>
-              </a:ext>
-            </a:extLst>
-          </p:cNvPr>
-          <p:cNvPicPr>
-            <a:picLocks noChangeAspect="1"/>
-          </p:cNvPicPr>
-          <p:nvPr/>
-        </p:nvPicPr>
-        <p:blipFill>
-          <a:blip r:embed="rId10"/>
-          <a:stretch>
-            <a:fillRect/>
-          </a:stretch>
-        </p:blipFill>
-        <p:spPr>
-          <a:xfrm>
-            <a:off x="470873" y="17448806"/>
-            <a:ext cx="6578600" cy="4381500"/>
-          </a:xfrm>
-          <a:prstGeom prst="rect">
-            <a:avLst/>
-          </a:prstGeom>
-        </p:spPr>
-      </p:pic>
-      <p:pic>
-        <p:nvPicPr>
-          <p:cNvPr id="39" name="Picture 38">
-            <a:extLst>
-              <a:ext uri="{FF2B5EF4-FFF2-40B4-BE49-F238E27FC236}">
-                <a16:creationId xmlns:a16="http://schemas.microsoft.com/office/drawing/2014/main" id="{D84435EC-D4AF-FFF8-49A7-2B28E77AE9F2}"/>
-              </a:ext>
-            </a:extLst>
-          </p:cNvPr>
-          <p:cNvPicPr>
-            <a:picLocks noChangeAspect="1"/>
-          </p:cNvPicPr>
-          <p:nvPr/>
-        </p:nvPicPr>
-        <p:blipFill>
-          <a:blip r:embed="rId11"/>
-          <a:stretch>
-            <a:fillRect/>
-          </a:stretch>
-        </p:blipFill>
-        <p:spPr>
-          <a:xfrm>
-            <a:off x="7076577" y="17526008"/>
-            <a:ext cx="6496898" cy="4331265"/>
-          </a:xfrm>
-          <a:prstGeom prst="rect">
-            <a:avLst/>
-          </a:prstGeom>
-        </p:spPr>
-      </p:pic>
-      <p:pic>
-        <p:nvPicPr>
-          <p:cNvPr id="41" name="Picture 40">
-            <a:extLst>
-              <a:ext uri="{FF2B5EF4-FFF2-40B4-BE49-F238E27FC236}">
-                <a16:creationId xmlns:a16="http://schemas.microsoft.com/office/drawing/2014/main" id="{E20042E6-D90F-2B8C-35B9-E3ECF5519797}"/>
-              </a:ext>
-            </a:extLst>
-          </p:cNvPr>
-          <p:cNvPicPr>
-            <a:picLocks noChangeAspect="1"/>
-          </p:cNvPicPr>
-          <p:nvPr/>
-        </p:nvPicPr>
-        <p:blipFill>
-          <a:blip r:embed="rId12"/>
-          <a:stretch>
-            <a:fillRect/>
-          </a:stretch>
-        </p:blipFill>
-        <p:spPr>
-          <a:xfrm>
-            <a:off x="508568" y="21857273"/>
-            <a:ext cx="6578600" cy="4381500"/>
-          </a:xfrm>
-          <a:prstGeom prst="rect">
-            <a:avLst/>
-          </a:prstGeom>
-        </p:spPr>
-      </p:pic>
-      <p:pic>
-        <p:nvPicPr>
-          <p:cNvPr id="43" name="Picture 42">
-            <a:extLst>
-              <a:ext uri="{FF2B5EF4-FFF2-40B4-BE49-F238E27FC236}">
-                <a16:creationId xmlns:a16="http://schemas.microsoft.com/office/drawing/2014/main" id="{1316A2E1-557F-8E74-08E8-D0E11A735C8F}"/>
-              </a:ext>
-            </a:extLst>
-          </p:cNvPr>
-          <p:cNvPicPr>
-            <a:picLocks noChangeAspect="1"/>
-          </p:cNvPicPr>
-          <p:nvPr/>
-        </p:nvPicPr>
-        <p:blipFill>
-          <a:blip r:embed="rId13"/>
-          <a:stretch>
-            <a:fillRect/>
-          </a:stretch>
-        </p:blipFill>
-        <p:spPr>
-          <a:xfrm>
-            <a:off x="7087168" y="21907504"/>
-            <a:ext cx="6496898" cy="4331265"/>
+            <a:off x="7022782" y="4373611"/>
+            <a:ext cx="6583681" cy="4389120"/>
           </a:xfrm>
           <a:prstGeom prst="rect">
             <a:avLst/>

</xml_diff>